<commit_message>
support for importing gct3 files.
</commit_message>
<xml_diff>
--- a/docs/app_structure.pptx
+++ b/docs/app_structure.pptx
@@ -6,6 +6,7 @@
   </p:sldMasterIdLst>
   <p:sldIdLst>
     <p:sldId id="256" r:id="rId2"/>
+    <p:sldId id="258" r:id="rId3"/>
   </p:sldIdLst>
   <p:sldSz cx="6858000" cy="12192000"/>
   <p:notesSz cx="6858000" cy="9144000"/>
@@ -104,7 +105,16 @@
       </a:defRPr>
     </a:lvl9pPr>
   </p:defaultTextStyle>
+  <p:extLst>
+    <p:ext uri="{EFAFB233-063F-42B5-8137-9DF3F51BA10A}">
+      <p15:sldGuideLst xmlns:p15="http://schemas.microsoft.com/office/powerpoint/2012/main"/>
+    </p:ext>
+  </p:extLst>
 </p:presentation>
+</file>
+
+<file path=ppt/revisionInfo.xml><?xml version="1.0" encoding="utf-8"?>
+<p1510:revInfo xmlns:a="http://schemas.openxmlformats.org/drawingml/2006/main" xmlns:r="http://schemas.openxmlformats.org/officeDocument/2006/relationships" xmlns:p1510="http://schemas.microsoft.com/office/powerpoint/2015/10/main"/>
 </file>
 
 <file path=ppt/slideLayouts/slideLayout1.xml><?xml version="1.0" encoding="utf-8"?>
@@ -149,7 +159,7 @@
           </a:lstStyle>
           <a:p>
             <a:r>
-              <a:rPr lang="en-US" smtClean="0"/>
+              <a:rPr lang="en-US"/>
               <a:t>Click to edit Master title style</a:t>
             </a:r>
             <a:endParaRPr lang="en-US" dirty="0"/>
@@ -214,7 +224,7 @@
           </a:lstStyle>
           <a:p>
             <a:r>
-              <a:rPr lang="en-US" smtClean="0"/>
+              <a:rPr lang="en-US"/>
               <a:t>Click to edit Master subtitle style</a:t>
             </a:r>
             <a:endParaRPr lang="en-US" dirty="0"/>
@@ -238,7 +248,7 @@
           <a:p>
             <a:fld id="{D7EDB0F2-969D-4AEA-9715-0F2F17A09D5A}" type="datetimeFigureOut">
               <a:rPr lang="en-US" smtClean="0"/>
-              <a:t>2/28/2017</a:t>
+              <a:t>12/24/2017</a:t>
             </a:fld>
             <a:endParaRPr lang="en-US"/>
           </a:p>
@@ -332,7 +342,7 @@
           <a:lstStyle/>
           <a:p>
             <a:r>
-              <a:rPr lang="en-US" smtClean="0"/>
+              <a:rPr lang="en-US"/>
               <a:t>Click to edit Master title style</a:t>
             </a:r>
             <a:endParaRPr lang="en-US" dirty="0"/>
@@ -356,35 +366,35 @@
           <a:p>
             <a:pPr lvl="0"/>
             <a:r>
-              <a:rPr lang="en-US" smtClean="0"/>
+              <a:rPr lang="en-US"/>
               <a:t>Click to edit Master text styles</a:t>
             </a:r>
           </a:p>
           <a:p>
             <a:pPr lvl="1"/>
             <a:r>
-              <a:rPr lang="en-US" smtClean="0"/>
+              <a:rPr lang="en-US"/>
               <a:t>Second level</a:t>
             </a:r>
           </a:p>
           <a:p>
             <a:pPr lvl="2"/>
             <a:r>
-              <a:rPr lang="en-US" smtClean="0"/>
+              <a:rPr lang="en-US"/>
               <a:t>Third level</a:t>
             </a:r>
           </a:p>
           <a:p>
             <a:pPr lvl="3"/>
             <a:r>
-              <a:rPr lang="en-US" smtClean="0"/>
+              <a:rPr lang="en-US"/>
               <a:t>Fourth level</a:t>
             </a:r>
           </a:p>
           <a:p>
             <a:pPr lvl="4"/>
             <a:r>
-              <a:rPr lang="en-US" smtClean="0"/>
+              <a:rPr lang="en-US"/>
               <a:t>Fifth level</a:t>
             </a:r>
             <a:endParaRPr lang="en-US" dirty="0"/>
@@ -408,7 +418,7 @@
           <a:p>
             <a:fld id="{D7EDB0F2-969D-4AEA-9715-0F2F17A09D5A}" type="datetimeFigureOut">
               <a:rPr lang="en-US" smtClean="0"/>
-              <a:t>2/28/2017</a:t>
+              <a:t>12/24/2017</a:t>
             </a:fld>
             <a:endParaRPr lang="en-US"/>
           </a:p>
@@ -507,7 +517,7 @@
           <a:lstStyle/>
           <a:p>
             <a:r>
-              <a:rPr lang="en-US" smtClean="0"/>
+              <a:rPr lang="en-US"/>
               <a:t>Click to edit Master title style</a:t>
             </a:r>
             <a:endParaRPr lang="en-US" dirty="0"/>
@@ -536,35 +546,35 @@
           <a:p>
             <a:pPr lvl="0"/>
             <a:r>
-              <a:rPr lang="en-US" smtClean="0"/>
+              <a:rPr lang="en-US"/>
               <a:t>Click to edit Master text styles</a:t>
             </a:r>
           </a:p>
           <a:p>
             <a:pPr lvl="1"/>
             <a:r>
-              <a:rPr lang="en-US" smtClean="0"/>
+              <a:rPr lang="en-US"/>
               <a:t>Second level</a:t>
             </a:r>
           </a:p>
           <a:p>
             <a:pPr lvl="2"/>
             <a:r>
-              <a:rPr lang="en-US" smtClean="0"/>
+              <a:rPr lang="en-US"/>
               <a:t>Third level</a:t>
             </a:r>
           </a:p>
           <a:p>
             <a:pPr lvl="3"/>
             <a:r>
-              <a:rPr lang="en-US" smtClean="0"/>
+              <a:rPr lang="en-US"/>
               <a:t>Fourth level</a:t>
             </a:r>
           </a:p>
           <a:p>
             <a:pPr lvl="4"/>
             <a:r>
-              <a:rPr lang="en-US" smtClean="0"/>
+              <a:rPr lang="en-US"/>
               <a:t>Fifth level</a:t>
             </a:r>
             <a:endParaRPr lang="en-US" dirty="0"/>
@@ -588,7 +598,7 @@
           <a:p>
             <a:fld id="{D7EDB0F2-969D-4AEA-9715-0F2F17A09D5A}" type="datetimeFigureOut">
               <a:rPr lang="en-US" smtClean="0"/>
-              <a:t>2/28/2017</a:t>
+              <a:t>12/24/2017</a:t>
             </a:fld>
             <a:endParaRPr lang="en-US"/>
           </a:p>
@@ -682,7 +692,7 @@
           <a:lstStyle/>
           <a:p>
             <a:r>
-              <a:rPr lang="en-US" smtClean="0"/>
+              <a:rPr lang="en-US"/>
               <a:t>Click to edit Master title style</a:t>
             </a:r>
             <a:endParaRPr lang="en-US" dirty="0"/>
@@ -706,35 +716,35 @@
           <a:p>
             <a:pPr lvl="0"/>
             <a:r>
-              <a:rPr lang="en-US" smtClean="0"/>
+              <a:rPr lang="en-US"/>
               <a:t>Click to edit Master text styles</a:t>
             </a:r>
           </a:p>
           <a:p>
             <a:pPr lvl="1"/>
             <a:r>
-              <a:rPr lang="en-US" smtClean="0"/>
+              <a:rPr lang="en-US"/>
               <a:t>Second level</a:t>
             </a:r>
           </a:p>
           <a:p>
             <a:pPr lvl="2"/>
             <a:r>
-              <a:rPr lang="en-US" smtClean="0"/>
+              <a:rPr lang="en-US"/>
               <a:t>Third level</a:t>
             </a:r>
           </a:p>
           <a:p>
             <a:pPr lvl="3"/>
             <a:r>
-              <a:rPr lang="en-US" smtClean="0"/>
+              <a:rPr lang="en-US"/>
               <a:t>Fourth level</a:t>
             </a:r>
           </a:p>
           <a:p>
             <a:pPr lvl="4"/>
             <a:r>
-              <a:rPr lang="en-US" smtClean="0"/>
+              <a:rPr lang="en-US"/>
               <a:t>Fifth level</a:t>
             </a:r>
             <a:endParaRPr lang="en-US" dirty="0"/>
@@ -758,7 +768,7 @@
           <a:p>
             <a:fld id="{D7EDB0F2-969D-4AEA-9715-0F2F17A09D5A}" type="datetimeFigureOut">
               <a:rPr lang="en-US" smtClean="0"/>
-              <a:t>2/28/2017</a:t>
+              <a:t>12/24/2017</a:t>
             </a:fld>
             <a:endParaRPr lang="en-US"/>
           </a:p>
@@ -861,7 +871,7 @@
           </a:lstStyle>
           <a:p>
             <a:r>
-              <a:rPr lang="en-US" smtClean="0"/>
+              <a:rPr lang="en-US"/>
               <a:t>Click to edit Master title style</a:t>
             </a:r>
             <a:endParaRPr lang="en-US" dirty="0"/>
@@ -979,7 +989,7 @@
           <a:p>
             <a:pPr lvl="0"/>
             <a:r>
-              <a:rPr lang="en-US" smtClean="0"/>
+              <a:rPr lang="en-US"/>
               <a:t>Click to edit Master text styles</a:t>
             </a:r>
           </a:p>
@@ -1002,7 +1012,7 @@
           <a:p>
             <a:fld id="{D7EDB0F2-969D-4AEA-9715-0F2F17A09D5A}" type="datetimeFigureOut">
               <a:rPr lang="en-US" smtClean="0"/>
-              <a:t>2/28/2017</a:t>
+              <a:t>12/24/2017</a:t>
             </a:fld>
             <a:endParaRPr lang="en-US"/>
           </a:p>
@@ -1096,7 +1106,7 @@
           <a:lstStyle/>
           <a:p>
             <a:r>
-              <a:rPr lang="en-US" smtClean="0"/>
+              <a:rPr lang="en-US"/>
               <a:t>Click to edit Master title style</a:t>
             </a:r>
             <a:endParaRPr lang="en-US" dirty="0"/>
@@ -1125,35 +1135,35 @@
           <a:p>
             <a:pPr lvl="0"/>
             <a:r>
-              <a:rPr lang="en-US" smtClean="0"/>
+              <a:rPr lang="en-US"/>
               <a:t>Click to edit Master text styles</a:t>
             </a:r>
           </a:p>
           <a:p>
             <a:pPr lvl="1"/>
             <a:r>
-              <a:rPr lang="en-US" smtClean="0"/>
+              <a:rPr lang="en-US"/>
               <a:t>Second level</a:t>
             </a:r>
           </a:p>
           <a:p>
             <a:pPr lvl="2"/>
             <a:r>
-              <a:rPr lang="en-US" smtClean="0"/>
+              <a:rPr lang="en-US"/>
               <a:t>Third level</a:t>
             </a:r>
           </a:p>
           <a:p>
             <a:pPr lvl="3"/>
             <a:r>
-              <a:rPr lang="en-US" smtClean="0"/>
+              <a:rPr lang="en-US"/>
               <a:t>Fourth level</a:t>
             </a:r>
           </a:p>
           <a:p>
             <a:pPr lvl="4"/>
             <a:r>
-              <a:rPr lang="en-US" smtClean="0"/>
+              <a:rPr lang="en-US"/>
               <a:t>Fifth level</a:t>
             </a:r>
             <a:endParaRPr lang="en-US" dirty="0"/>
@@ -1182,35 +1192,35 @@
           <a:p>
             <a:pPr lvl="0"/>
             <a:r>
-              <a:rPr lang="en-US" smtClean="0"/>
+              <a:rPr lang="en-US"/>
               <a:t>Click to edit Master text styles</a:t>
             </a:r>
           </a:p>
           <a:p>
             <a:pPr lvl="1"/>
             <a:r>
-              <a:rPr lang="en-US" smtClean="0"/>
+              <a:rPr lang="en-US"/>
               <a:t>Second level</a:t>
             </a:r>
           </a:p>
           <a:p>
             <a:pPr lvl="2"/>
             <a:r>
-              <a:rPr lang="en-US" smtClean="0"/>
+              <a:rPr lang="en-US"/>
               <a:t>Third level</a:t>
             </a:r>
           </a:p>
           <a:p>
             <a:pPr lvl="3"/>
             <a:r>
-              <a:rPr lang="en-US" smtClean="0"/>
+              <a:rPr lang="en-US"/>
               <a:t>Fourth level</a:t>
             </a:r>
           </a:p>
           <a:p>
             <a:pPr lvl="4"/>
             <a:r>
-              <a:rPr lang="en-US" smtClean="0"/>
+              <a:rPr lang="en-US"/>
               <a:t>Fifth level</a:t>
             </a:r>
             <a:endParaRPr lang="en-US" dirty="0"/>
@@ -1234,7 +1244,7 @@
           <a:p>
             <a:fld id="{D7EDB0F2-969D-4AEA-9715-0F2F17A09D5A}" type="datetimeFigureOut">
               <a:rPr lang="en-US" smtClean="0"/>
-              <a:t>2/28/2017</a:t>
+              <a:t>12/24/2017</a:t>
             </a:fld>
             <a:endParaRPr lang="en-US"/>
           </a:p>
@@ -1333,7 +1343,7 @@
           <a:lstStyle/>
           <a:p>
             <a:r>
-              <a:rPr lang="en-US" smtClean="0"/>
+              <a:rPr lang="en-US"/>
               <a:t>Click to edit Master title style</a:t>
             </a:r>
             <a:endParaRPr lang="en-US" dirty="0"/>
@@ -1399,7 +1409,7 @@
           <a:p>
             <a:pPr lvl="0"/>
             <a:r>
-              <a:rPr lang="en-US" smtClean="0"/>
+              <a:rPr lang="en-US"/>
               <a:t>Click to edit Master text styles</a:t>
             </a:r>
           </a:p>
@@ -1427,35 +1437,35 @@
           <a:p>
             <a:pPr lvl="0"/>
             <a:r>
-              <a:rPr lang="en-US" smtClean="0"/>
+              <a:rPr lang="en-US"/>
               <a:t>Click to edit Master text styles</a:t>
             </a:r>
           </a:p>
           <a:p>
             <a:pPr lvl="1"/>
             <a:r>
-              <a:rPr lang="en-US" smtClean="0"/>
+              <a:rPr lang="en-US"/>
               <a:t>Second level</a:t>
             </a:r>
           </a:p>
           <a:p>
             <a:pPr lvl="2"/>
             <a:r>
-              <a:rPr lang="en-US" smtClean="0"/>
+              <a:rPr lang="en-US"/>
               <a:t>Third level</a:t>
             </a:r>
           </a:p>
           <a:p>
             <a:pPr lvl="3"/>
             <a:r>
-              <a:rPr lang="en-US" smtClean="0"/>
+              <a:rPr lang="en-US"/>
               <a:t>Fourth level</a:t>
             </a:r>
           </a:p>
           <a:p>
             <a:pPr lvl="4"/>
             <a:r>
-              <a:rPr lang="en-US" smtClean="0"/>
+              <a:rPr lang="en-US"/>
               <a:t>Fifth level</a:t>
             </a:r>
             <a:endParaRPr lang="en-US" dirty="0"/>
@@ -1521,7 +1531,7 @@
           <a:p>
             <a:pPr lvl="0"/>
             <a:r>
-              <a:rPr lang="en-US" smtClean="0"/>
+              <a:rPr lang="en-US"/>
               <a:t>Click to edit Master text styles</a:t>
             </a:r>
           </a:p>
@@ -1549,35 +1559,35 @@
           <a:p>
             <a:pPr lvl="0"/>
             <a:r>
-              <a:rPr lang="en-US" smtClean="0"/>
+              <a:rPr lang="en-US"/>
               <a:t>Click to edit Master text styles</a:t>
             </a:r>
           </a:p>
           <a:p>
             <a:pPr lvl="1"/>
             <a:r>
-              <a:rPr lang="en-US" smtClean="0"/>
+              <a:rPr lang="en-US"/>
               <a:t>Second level</a:t>
             </a:r>
           </a:p>
           <a:p>
             <a:pPr lvl="2"/>
             <a:r>
-              <a:rPr lang="en-US" smtClean="0"/>
+              <a:rPr lang="en-US"/>
               <a:t>Third level</a:t>
             </a:r>
           </a:p>
           <a:p>
             <a:pPr lvl="3"/>
             <a:r>
-              <a:rPr lang="en-US" smtClean="0"/>
+              <a:rPr lang="en-US"/>
               <a:t>Fourth level</a:t>
             </a:r>
           </a:p>
           <a:p>
             <a:pPr lvl="4"/>
             <a:r>
-              <a:rPr lang="en-US" smtClean="0"/>
+              <a:rPr lang="en-US"/>
               <a:t>Fifth level</a:t>
             </a:r>
             <a:endParaRPr lang="en-US" dirty="0"/>
@@ -1601,7 +1611,7 @@
           <a:p>
             <a:fld id="{D7EDB0F2-969D-4AEA-9715-0F2F17A09D5A}" type="datetimeFigureOut">
               <a:rPr lang="en-US" smtClean="0"/>
-              <a:t>2/28/2017</a:t>
+              <a:t>12/24/2017</a:t>
             </a:fld>
             <a:endParaRPr lang="en-US"/>
           </a:p>
@@ -1695,7 +1705,7 @@
           <a:lstStyle/>
           <a:p>
             <a:r>
-              <a:rPr lang="en-US" smtClean="0"/>
+              <a:rPr lang="en-US"/>
               <a:t>Click to edit Master title style</a:t>
             </a:r>
             <a:endParaRPr lang="en-US" dirty="0"/>
@@ -1719,7 +1729,7 @@
           <a:p>
             <a:fld id="{D7EDB0F2-969D-4AEA-9715-0F2F17A09D5A}" type="datetimeFigureOut">
               <a:rPr lang="en-US" smtClean="0"/>
-              <a:t>2/28/2017</a:t>
+              <a:t>12/24/2017</a:t>
             </a:fld>
             <a:endParaRPr lang="en-US"/>
           </a:p>
@@ -1814,7 +1824,7 @@
           <a:p>
             <a:fld id="{D7EDB0F2-969D-4AEA-9715-0F2F17A09D5A}" type="datetimeFigureOut">
               <a:rPr lang="en-US" smtClean="0"/>
-              <a:t>2/28/2017</a:t>
+              <a:t>12/24/2017</a:t>
             </a:fld>
             <a:endParaRPr lang="en-US"/>
           </a:p>
@@ -1917,7 +1927,7 @@
           </a:lstStyle>
           <a:p>
             <a:r>
-              <a:rPr lang="en-US" smtClean="0"/>
+              <a:rPr lang="en-US"/>
               <a:t>Click to edit Master title style</a:t>
             </a:r>
             <a:endParaRPr lang="en-US" dirty="0"/>
@@ -1974,35 +1984,35 @@
           <a:p>
             <a:pPr lvl="0"/>
             <a:r>
-              <a:rPr lang="en-US" smtClean="0"/>
+              <a:rPr lang="en-US"/>
               <a:t>Click to edit Master text styles</a:t>
             </a:r>
           </a:p>
           <a:p>
             <a:pPr lvl="1"/>
             <a:r>
-              <a:rPr lang="en-US" smtClean="0"/>
+              <a:rPr lang="en-US"/>
               <a:t>Second level</a:t>
             </a:r>
           </a:p>
           <a:p>
             <a:pPr lvl="2"/>
             <a:r>
-              <a:rPr lang="en-US" smtClean="0"/>
+              <a:rPr lang="en-US"/>
               <a:t>Third level</a:t>
             </a:r>
           </a:p>
           <a:p>
             <a:pPr lvl="3"/>
             <a:r>
-              <a:rPr lang="en-US" smtClean="0"/>
+              <a:rPr lang="en-US"/>
               <a:t>Fourth level</a:t>
             </a:r>
           </a:p>
           <a:p>
             <a:pPr lvl="4"/>
             <a:r>
-              <a:rPr lang="en-US" smtClean="0"/>
+              <a:rPr lang="en-US"/>
               <a:t>Fifth level</a:t>
             </a:r>
             <a:endParaRPr lang="en-US" dirty="0"/>
@@ -2068,7 +2078,7 @@
           <a:p>
             <a:pPr lvl="0"/>
             <a:r>
-              <a:rPr lang="en-US" smtClean="0"/>
+              <a:rPr lang="en-US"/>
               <a:t>Click to edit Master text styles</a:t>
             </a:r>
           </a:p>
@@ -2091,7 +2101,7 @@
           <a:p>
             <a:fld id="{D7EDB0F2-969D-4AEA-9715-0F2F17A09D5A}" type="datetimeFigureOut">
               <a:rPr lang="en-US" smtClean="0"/>
-              <a:t>2/28/2017</a:t>
+              <a:t>12/24/2017</a:t>
             </a:fld>
             <a:endParaRPr lang="en-US"/>
           </a:p>
@@ -2194,7 +2204,7 @@
           </a:lstStyle>
           <a:p>
             <a:r>
-              <a:rPr lang="en-US" smtClean="0"/>
+              <a:rPr lang="en-US"/>
               <a:t>Click to edit Master title style</a:t>
             </a:r>
             <a:endParaRPr lang="en-US" dirty="0"/>
@@ -2259,7 +2269,7 @@
           </a:lstStyle>
           <a:p>
             <a:r>
-              <a:rPr lang="en-US" smtClean="0"/>
+              <a:rPr lang="en-US"/>
               <a:t>Click icon to add picture</a:t>
             </a:r>
             <a:endParaRPr lang="en-US" dirty="0"/>
@@ -2325,7 +2335,7 @@
           <a:p>
             <a:pPr lvl="0"/>
             <a:r>
-              <a:rPr lang="en-US" smtClean="0"/>
+              <a:rPr lang="en-US"/>
               <a:t>Click to edit Master text styles</a:t>
             </a:r>
           </a:p>
@@ -2348,7 +2358,7 @@
           <a:p>
             <a:fld id="{D7EDB0F2-969D-4AEA-9715-0F2F17A09D5A}" type="datetimeFigureOut">
               <a:rPr lang="en-US" smtClean="0"/>
-              <a:t>2/28/2017</a:t>
+              <a:t>12/24/2017</a:t>
             </a:fld>
             <a:endParaRPr lang="en-US"/>
           </a:p>
@@ -2457,7 +2467,7 @@
           <a:lstStyle/>
           <a:p>
             <a:r>
-              <a:rPr lang="en-US" smtClean="0"/>
+              <a:rPr lang="en-US"/>
               <a:t>Click to edit Master title style</a:t>
             </a:r>
             <a:endParaRPr lang="en-US" dirty="0"/>
@@ -2491,35 +2501,35 @@
           <a:p>
             <a:pPr lvl="0"/>
             <a:r>
-              <a:rPr lang="en-US" smtClean="0"/>
+              <a:rPr lang="en-US"/>
               <a:t>Click to edit Master text styles</a:t>
             </a:r>
           </a:p>
           <a:p>
             <a:pPr lvl="1"/>
             <a:r>
-              <a:rPr lang="en-US" smtClean="0"/>
+              <a:rPr lang="en-US"/>
               <a:t>Second level</a:t>
             </a:r>
           </a:p>
           <a:p>
             <a:pPr lvl="2"/>
             <a:r>
-              <a:rPr lang="en-US" smtClean="0"/>
+              <a:rPr lang="en-US"/>
               <a:t>Third level</a:t>
             </a:r>
           </a:p>
           <a:p>
             <a:pPr lvl="3"/>
             <a:r>
-              <a:rPr lang="en-US" smtClean="0"/>
+              <a:rPr lang="en-US"/>
               <a:t>Fourth level</a:t>
             </a:r>
           </a:p>
           <a:p>
             <a:pPr lvl="4"/>
             <a:r>
-              <a:rPr lang="en-US" smtClean="0"/>
+              <a:rPr lang="en-US"/>
               <a:t>Fifth level</a:t>
             </a:r>
             <a:endParaRPr lang="en-US" dirty="0"/>
@@ -2561,7 +2571,7 @@
           <a:p>
             <a:fld id="{D7EDB0F2-969D-4AEA-9715-0F2F17A09D5A}" type="datetimeFigureOut">
               <a:rPr lang="en-US" smtClean="0"/>
-              <a:t>2/28/2017</a:t>
+              <a:t>12/24/2017</a:t>
             </a:fld>
             <a:endParaRPr lang="en-US"/>
           </a:p>
@@ -3049,10 +3059,9 @@
           <a:p>
             <a:pPr algn="ctr"/>
             <a:r>
-              <a:rPr lang="en-US" dirty="0" smtClean="0"/>
+              <a:rPr lang="en-US" dirty="0"/>
               <a:t>Reactive Variables (data containers)</a:t>
             </a:r>
-            <a:endParaRPr lang="en-US" dirty="0"/>
           </a:p>
         </p:txBody>
       </p:sp>
@@ -3093,10 +3102,9 @@
           <a:p>
             <a:pPr algn="ctr"/>
             <a:r>
-              <a:rPr lang="en-US" dirty="0" smtClean="0"/>
+              <a:rPr lang="en-US" dirty="0"/>
               <a:t>Initialize Dynamic UI elements</a:t>
             </a:r>
-            <a:endParaRPr lang="en-US" dirty="0"/>
           </a:p>
         </p:txBody>
       </p:sp>
@@ -3137,7 +3145,7 @@
           <a:p>
             <a:pPr algn="ctr"/>
             <a:r>
-              <a:rPr lang="en-US" dirty="0" smtClean="0"/>
+              <a:rPr lang="en-US" dirty="0"/>
               <a:t>Define Dynamic UI elements related to data import</a:t>
             </a:r>
           </a:p>
@@ -3180,10 +3188,9 @@
           <a:p>
             <a:pPr algn="ctr"/>
             <a:r>
-              <a:rPr lang="en-US" dirty="0" smtClean="0"/>
+              <a:rPr lang="en-US" dirty="0"/>
               <a:t>Perform computation</a:t>
             </a:r>
-            <a:endParaRPr lang="en-US" dirty="0"/>
           </a:p>
         </p:txBody>
       </p:sp>
@@ -3224,10 +3231,9 @@
           <a:p>
             <a:pPr algn="ctr"/>
             <a:r>
-              <a:rPr lang="en-US" dirty="0" smtClean="0"/>
+              <a:rPr lang="en-US" dirty="0"/>
               <a:t>Output: render plots, tables, …</a:t>
             </a:r>
-            <a:endParaRPr lang="en-US" dirty="0"/>
           </a:p>
         </p:txBody>
       </p:sp>
@@ -3268,10 +3274,9 @@
           <a:p>
             <a:pPr algn="ctr"/>
             <a:r>
-              <a:rPr lang="en-US" dirty="0" smtClean="0"/>
+              <a:rPr lang="en-US" dirty="0"/>
               <a:t>Export results</a:t>
             </a:r>
-            <a:endParaRPr lang="en-US" dirty="0"/>
           </a:p>
         </p:txBody>
       </p:sp>
@@ -3298,7 +3303,7 @@
           <a:lstStyle/>
           <a:p>
             <a:r>
-              <a:rPr lang="en-US" dirty="0" err="1" smtClean="0"/>
+              <a:rPr lang="en-US" dirty="0" err="1"/>
               <a:t>server.R</a:t>
             </a:r>
             <a:endParaRPr lang="en-US" dirty="0"/>
@@ -3309,6 +3314,3095 @@
     <p:extLst>
       <p:ext uri="{BB962C8B-B14F-4D97-AF65-F5344CB8AC3E}">
         <p14:creationId xmlns:p14="http://schemas.microsoft.com/office/powerpoint/2010/main" val="727617583"/>
+      </p:ext>
+    </p:extLst>
+  </p:cSld>
+  <p:clrMapOvr>
+    <a:masterClrMapping/>
+  </p:clrMapOvr>
+</p:sld>
+</file>
+
+<file path=ppt/slides/slide2.xml><?xml version="1.0" encoding="utf-8"?>
+<p:sld xmlns:a="http://schemas.openxmlformats.org/drawingml/2006/main" xmlns:r="http://schemas.openxmlformats.org/officeDocument/2006/relationships" xmlns:p="http://schemas.openxmlformats.org/presentationml/2006/main">
+  <p:cSld>
+    <p:spTree>
+      <p:nvGrpSpPr>
+        <p:cNvPr id="1" name=""/>
+        <p:cNvGrpSpPr/>
+        <p:nvPr/>
+      </p:nvGrpSpPr>
+      <p:grpSpPr>
+        <a:xfrm>
+          <a:off x="0" y="0"/>
+          <a:ext cx="0" cy="0"/>
+          <a:chOff x="0" y="0"/>
+          <a:chExt cx="0" cy="0"/>
+        </a:xfrm>
+      </p:grpSpPr>
+      <p:grpSp>
+        <p:nvGrpSpPr>
+          <p:cNvPr id="4" name="Group 3">
+            <a:extLst>
+              <a:ext uri="{FF2B5EF4-FFF2-40B4-BE49-F238E27FC236}">
+                <a16:creationId xmlns:a16="http://schemas.microsoft.com/office/drawing/2014/main" id="{A5F37AB0-506F-41BD-89B1-2F8AE9B65A15}"/>
+              </a:ext>
+            </a:extLst>
+          </p:cNvPr>
+          <p:cNvGrpSpPr/>
+          <p:nvPr/>
+        </p:nvGrpSpPr>
+        <p:grpSpPr>
+          <a:xfrm>
+            <a:off x="2576291" y="4339082"/>
+            <a:ext cx="1364760" cy="1380117"/>
+            <a:chOff x="393700" y="417565"/>
+            <a:chExt cx="1364760" cy="1380117"/>
+          </a:xfrm>
+        </p:grpSpPr>
+        <p:sp>
+          <p:nvSpPr>
+            <p:cNvPr id="2" name="Rectangle 1">
+              <a:extLst>
+                <a:ext uri="{FF2B5EF4-FFF2-40B4-BE49-F238E27FC236}">
+                  <a16:creationId xmlns:a16="http://schemas.microsoft.com/office/drawing/2014/main" id="{565C5EEF-B1B1-43E4-BA12-387D8D9A38B4}"/>
+                </a:ext>
+              </a:extLst>
+            </p:cNvPr>
+            <p:cNvSpPr/>
+            <p:nvPr/>
+          </p:nvSpPr>
+          <p:spPr>
+            <a:xfrm>
+              <a:off x="504091" y="879230"/>
+              <a:ext cx="1254369" cy="918452"/>
+            </a:xfrm>
+            <a:prstGeom prst="rect">
+              <a:avLst/>
+            </a:prstGeom>
+          </p:spPr>
+          <p:style>
+            <a:lnRef idx="2">
+              <a:schemeClr val="accent1">
+                <a:shade val="50000"/>
+              </a:schemeClr>
+            </a:lnRef>
+            <a:fillRef idx="1">
+              <a:schemeClr val="accent1"/>
+            </a:fillRef>
+            <a:effectRef idx="0">
+              <a:schemeClr val="accent1"/>
+            </a:effectRef>
+            <a:fontRef idx="minor">
+              <a:schemeClr val="lt1"/>
+            </a:fontRef>
+          </p:style>
+          <p:txBody>
+            <a:bodyPr rtlCol="0" anchor="ctr"/>
+            <a:lstStyle/>
+            <a:p>
+              <a:pPr algn="ctr"/>
+              <a:r>
+                <a:rPr lang="en-US" sz="1200" dirty="0"/>
+                <a:t>Upload experimental design file </a:t>
+              </a:r>
+              <a:r>
+                <a:rPr lang="en-US" sz="1200" dirty="0" err="1">
+                  <a:solidFill>
+                    <a:srgbClr val="FF0000"/>
+                  </a:solidFill>
+                </a:rPr>
+                <a:t>global.param$grp.done</a:t>
+              </a:r>
+              <a:r>
+                <a:rPr lang="en-US" sz="1200" dirty="0">
+                  <a:solidFill>
+                    <a:srgbClr val="FF0000"/>
+                  </a:solidFill>
+                </a:rPr>
+                <a:t> = T</a:t>
+              </a:r>
+            </a:p>
+          </p:txBody>
+        </p:sp>
+        <p:sp>
+          <p:nvSpPr>
+            <p:cNvPr id="3" name="Rectangle 2">
+              <a:extLst>
+                <a:ext uri="{FF2B5EF4-FFF2-40B4-BE49-F238E27FC236}">
+                  <a16:creationId xmlns:a16="http://schemas.microsoft.com/office/drawing/2014/main" id="{12FF74C6-2F11-4658-9F4C-A3E36059AB69}"/>
+                </a:ext>
+              </a:extLst>
+            </p:cNvPr>
+            <p:cNvSpPr/>
+            <p:nvPr/>
+          </p:nvSpPr>
+          <p:spPr>
+            <a:xfrm>
+              <a:off x="393700" y="417565"/>
+              <a:ext cx="1070229" cy="461665"/>
+            </a:xfrm>
+            <a:prstGeom prst="rect">
+              <a:avLst/>
+            </a:prstGeom>
+          </p:spPr>
+          <p:txBody>
+            <a:bodyPr wrap="none">
+              <a:spAutoFit/>
+            </a:bodyPr>
+            <a:lstStyle/>
+            <a:p>
+              <a:r>
+                <a:rPr lang="en-US" sz="1200" dirty="0" err="1"/>
+                <a:t>observeEvent</a:t>
+              </a:r>
+              <a:r>
+                <a:rPr lang="en-US" sz="1200" dirty="0"/>
+                <a:t>:</a:t>
+              </a:r>
+            </a:p>
+            <a:p>
+              <a:r>
+                <a:rPr lang="en-US" sz="1200" dirty="0" err="1"/>
+                <a:t>input$exp.file</a:t>
+              </a:r>
+              <a:endParaRPr lang="en-US" sz="1200" dirty="0"/>
+            </a:p>
+          </p:txBody>
+        </p:sp>
+      </p:grpSp>
+      <p:grpSp>
+        <p:nvGrpSpPr>
+          <p:cNvPr id="5" name="Group 4">
+            <a:extLst>
+              <a:ext uri="{FF2B5EF4-FFF2-40B4-BE49-F238E27FC236}">
+                <a16:creationId xmlns:a16="http://schemas.microsoft.com/office/drawing/2014/main" id="{540CF579-1C70-4ED7-9890-5DB7E5CF3DDC}"/>
+              </a:ext>
+            </a:extLst>
+          </p:cNvPr>
+          <p:cNvGrpSpPr/>
+          <p:nvPr/>
+        </p:nvGrpSpPr>
+        <p:grpSpPr>
+          <a:xfrm>
+            <a:off x="4467847" y="5745060"/>
+            <a:ext cx="2007665" cy="1118158"/>
+            <a:chOff x="393700" y="417565"/>
+            <a:chExt cx="2007665" cy="1118158"/>
+          </a:xfrm>
+        </p:grpSpPr>
+        <p:sp>
+          <p:nvSpPr>
+            <p:cNvPr id="6" name="Rectangle 5">
+              <a:extLst>
+                <a:ext uri="{FF2B5EF4-FFF2-40B4-BE49-F238E27FC236}">
+                  <a16:creationId xmlns:a16="http://schemas.microsoft.com/office/drawing/2014/main" id="{6A4CAA33-2F9B-4EBE-AB58-60779B14CBAE}"/>
+                </a:ext>
+              </a:extLst>
+            </p:cNvPr>
+            <p:cNvSpPr/>
+            <p:nvPr/>
+          </p:nvSpPr>
+          <p:spPr>
+            <a:xfrm>
+              <a:off x="504091" y="879230"/>
+              <a:ext cx="1254369" cy="656493"/>
+            </a:xfrm>
+            <a:prstGeom prst="rect">
+              <a:avLst/>
+            </a:prstGeom>
+          </p:spPr>
+          <p:style>
+            <a:lnRef idx="2">
+              <a:schemeClr val="accent1">
+                <a:shade val="50000"/>
+              </a:schemeClr>
+            </a:lnRef>
+            <a:fillRef idx="1">
+              <a:schemeClr val="accent1"/>
+            </a:fillRef>
+            <a:effectRef idx="0">
+              <a:schemeClr val="accent1"/>
+            </a:effectRef>
+            <a:fontRef idx="minor">
+              <a:schemeClr val="lt1"/>
+            </a:fontRef>
+          </p:style>
+          <p:txBody>
+            <a:bodyPr rtlCol="0" anchor="ctr"/>
+            <a:lstStyle/>
+            <a:p>
+              <a:pPr algn="ctr"/>
+              <a:r>
+                <a:rPr lang="en-US" sz="1200" dirty="0"/>
+                <a:t>Import saved session</a:t>
+              </a:r>
+            </a:p>
+          </p:txBody>
+        </p:sp>
+        <p:sp>
+          <p:nvSpPr>
+            <p:cNvPr id="7" name="Rectangle 6">
+              <a:extLst>
+                <a:ext uri="{FF2B5EF4-FFF2-40B4-BE49-F238E27FC236}">
+                  <a16:creationId xmlns:a16="http://schemas.microsoft.com/office/drawing/2014/main" id="{08C739B5-FC57-46B0-8554-F0BBDC28C533}"/>
+                </a:ext>
+              </a:extLst>
+            </p:cNvPr>
+            <p:cNvSpPr/>
+            <p:nvPr/>
+          </p:nvSpPr>
+          <p:spPr>
+            <a:xfrm>
+              <a:off x="393700" y="417565"/>
+              <a:ext cx="2007665" cy="461665"/>
+            </a:xfrm>
+            <a:prstGeom prst="rect">
+              <a:avLst/>
+            </a:prstGeom>
+          </p:spPr>
+          <p:txBody>
+            <a:bodyPr wrap="none">
+              <a:spAutoFit/>
+            </a:bodyPr>
+            <a:lstStyle/>
+            <a:p>
+              <a:r>
+                <a:rPr lang="en-US" sz="1200" dirty="0" err="1"/>
+                <a:t>observeEvent</a:t>
+              </a:r>
+              <a:r>
+                <a:rPr lang="en-US" sz="1200" dirty="0"/>
+                <a:t>:</a:t>
+              </a:r>
+            </a:p>
+            <a:p>
+              <a:r>
+                <a:rPr lang="en-US" sz="1200" dirty="0" err="1"/>
+                <a:t>input$session.browse.import</a:t>
+              </a:r>
+              <a:endParaRPr lang="en-US" sz="1200" dirty="0"/>
+            </a:p>
+          </p:txBody>
+        </p:sp>
+      </p:grpSp>
+      <p:grpSp>
+        <p:nvGrpSpPr>
+          <p:cNvPr id="8" name="Group 7">
+            <a:extLst>
+              <a:ext uri="{FF2B5EF4-FFF2-40B4-BE49-F238E27FC236}">
+                <a16:creationId xmlns:a16="http://schemas.microsoft.com/office/drawing/2014/main" id="{02A16D7E-F7B5-416D-9566-B2BD26144166}"/>
+              </a:ext>
+            </a:extLst>
+          </p:cNvPr>
+          <p:cNvGrpSpPr/>
+          <p:nvPr/>
+        </p:nvGrpSpPr>
+        <p:grpSpPr>
+          <a:xfrm>
+            <a:off x="2539334" y="1114839"/>
+            <a:ext cx="1364760" cy="1118158"/>
+            <a:chOff x="393700" y="417565"/>
+            <a:chExt cx="1364760" cy="1118158"/>
+          </a:xfrm>
+        </p:grpSpPr>
+        <p:sp>
+          <p:nvSpPr>
+            <p:cNvPr id="9" name="Rectangle 8">
+              <a:extLst>
+                <a:ext uri="{FF2B5EF4-FFF2-40B4-BE49-F238E27FC236}">
+                  <a16:creationId xmlns:a16="http://schemas.microsoft.com/office/drawing/2014/main" id="{6D264AD6-A181-44C7-BF75-4C4D6A9C533E}"/>
+                </a:ext>
+              </a:extLst>
+            </p:cNvPr>
+            <p:cNvSpPr/>
+            <p:nvPr/>
+          </p:nvSpPr>
+          <p:spPr>
+            <a:xfrm>
+              <a:off x="504091" y="879230"/>
+              <a:ext cx="1254369" cy="656493"/>
+            </a:xfrm>
+            <a:prstGeom prst="rect">
+              <a:avLst/>
+            </a:prstGeom>
+          </p:spPr>
+          <p:style>
+            <a:lnRef idx="2">
+              <a:schemeClr val="accent1">
+                <a:shade val="50000"/>
+              </a:schemeClr>
+            </a:lnRef>
+            <a:fillRef idx="1">
+              <a:schemeClr val="accent1"/>
+            </a:fillRef>
+            <a:effectRef idx="0">
+              <a:schemeClr val="accent1"/>
+            </a:effectRef>
+            <a:fontRef idx="minor">
+              <a:schemeClr val="lt1"/>
+            </a:fontRef>
+          </p:style>
+          <p:txBody>
+            <a:bodyPr rtlCol="0" anchor="ctr"/>
+            <a:lstStyle/>
+            <a:p>
+              <a:pPr marL="171450" indent="-171450">
+                <a:buFontTx/>
+                <a:buChar char="-"/>
+              </a:pPr>
+              <a:r>
+                <a:rPr lang="en-US" sz="1200" dirty="0"/>
+                <a:t>File upload</a:t>
+              </a:r>
+            </a:p>
+            <a:p>
+              <a:pPr marL="171450" indent="-171450">
+                <a:buFontTx/>
+                <a:buChar char="-"/>
+              </a:pPr>
+              <a:r>
+                <a:rPr lang="en-US" sz="1200" dirty="0"/>
+                <a:t>File import (</a:t>
+              </a:r>
+              <a:r>
+                <a:rPr lang="en-US" sz="1200" dirty="0" err="1"/>
+                <a:t>gct</a:t>
+              </a:r>
+              <a:r>
+                <a:rPr lang="en-US" sz="1200" dirty="0"/>
+                <a:t>, txt)</a:t>
+              </a:r>
+            </a:p>
+          </p:txBody>
+        </p:sp>
+        <p:sp>
+          <p:nvSpPr>
+            <p:cNvPr id="10" name="Rectangle 9">
+              <a:extLst>
+                <a:ext uri="{FF2B5EF4-FFF2-40B4-BE49-F238E27FC236}">
+                  <a16:creationId xmlns:a16="http://schemas.microsoft.com/office/drawing/2014/main" id="{82C88BD3-3C8A-43BA-B4A2-0E537F69F1AB}"/>
+                </a:ext>
+              </a:extLst>
+            </p:cNvPr>
+            <p:cNvSpPr/>
+            <p:nvPr/>
+          </p:nvSpPr>
+          <p:spPr>
+            <a:xfrm>
+              <a:off x="393700" y="417565"/>
+              <a:ext cx="1085554" cy="461665"/>
+            </a:xfrm>
+            <a:prstGeom prst="rect">
+              <a:avLst/>
+            </a:prstGeom>
+          </p:spPr>
+          <p:txBody>
+            <a:bodyPr wrap="none">
+              <a:spAutoFit/>
+            </a:bodyPr>
+            <a:lstStyle/>
+            <a:p>
+              <a:r>
+                <a:rPr lang="en-US" sz="1200" dirty="0" err="1"/>
+                <a:t>observeEvent</a:t>
+              </a:r>
+              <a:r>
+                <a:rPr lang="en-US" sz="1200" dirty="0"/>
+                <a:t>:</a:t>
+              </a:r>
+            </a:p>
+            <a:p>
+              <a:r>
+                <a:rPr lang="en-US" sz="1200" dirty="0" err="1"/>
+                <a:t>input$file</a:t>
+              </a:r>
+              <a:endParaRPr lang="en-US" sz="1200" dirty="0"/>
+            </a:p>
+          </p:txBody>
+        </p:sp>
+      </p:grpSp>
+      <p:grpSp>
+        <p:nvGrpSpPr>
+          <p:cNvPr id="11" name="Group 10">
+            <a:extLst>
+              <a:ext uri="{FF2B5EF4-FFF2-40B4-BE49-F238E27FC236}">
+                <a16:creationId xmlns:a16="http://schemas.microsoft.com/office/drawing/2014/main" id="{BC32D1EF-B9BA-4C6D-BED4-3506E9D05C3D}"/>
+              </a:ext>
+            </a:extLst>
+          </p:cNvPr>
+          <p:cNvGrpSpPr/>
+          <p:nvPr/>
+        </p:nvGrpSpPr>
+        <p:grpSpPr>
+          <a:xfrm>
+            <a:off x="2586277" y="3084083"/>
+            <a:ext cx="1364760" cy="1118158"/>
+            <a:chOff x="393700" y="417565"/>
+            <a:chExt cx="1364760" cy="1118158"/>
+          </a:xfrm>
+        </p:grpSpPr>
+        <p:sp>
+          <p:nvSpPr>
+            <p:cNvPr id="12" name="Rectangle 11">
+              <a:extLst>
+                <a:ext uri="{FF2B5EF4-FFF2-40B4-BE49-F238E27FC236}">
+                  <a16:creationId xmlns:a16="http://schemas.microsoft.com/office/drawing/2014/main" id="{CBC6925D-A52D-4232-A28F-2F1E2FBD15E3}"/>
+                </a:ext>
+              </a:extLst>
+            </p:cNvPr>
+            <p:cNvSpPr/>
+            <p:nvPr/>
+          </p:nvSpPr>
+          <p:spPr>
+            <a:xfrm>
+              <a:off x="504091" y="879230"/>
+              <a:ext cx="1254369" cy="656493"/>
+            </a:xfrm>
+            <a:prstGeom prst="rect">
+              <a:avLst/>
+            </a:prstGeom>
+          </p:spPr>
+          <p:style>
+            <a:lnRef idx="2">
+              <a:schemeClr val="accent1">
+                <a:shade val="50000"/>
+              </a:schemeClr>
+            </a:lnRef>
+            <a:fillRef idx="1">
+              <a:schemeClr val="accent1"/>
+            </a:fillRef>
+            <a:effectRef idx="0">
+              <a:schemeClr val="accent1"/>
+            </a:effectRef>
+            <a:fontRef idx="minor">
+              <a:schemeClr val="lt1"/>
+            </a:fontRef>
+          </p:style>
+          <p:txBody>
+            <a:bodyPr rtlCol="0" anchor="ctr"/>
+            <a:lstStyle/>
+            <a:p>
+              <a:pPr algn="ctr"/>
+              <a:r>
+                <a:rPr lang="en-US" sz="1200" dirty="0"/>
+                <a:t>Choose id column</a:t>
+              </a:r>
+            </a:p>
+          </p:txBody>
+        </p:sp>
+        <p:sp>
+          <p:nvSpPr>
+            <p:cNvPr id="13" name="Rectangle 12">
+              <a:extLst>
+                <a:ext uri="{FF2B5EF4-FFF2-40B4-BE49-F238E27FC236}">
+                  <a16:creationId xmlns:a16="http://schemas.microsoft.com/office/drawing/2014/main" id="{2B3A5C63-F252-4A76-B312-9FF8D609B0AA}"/>
+                </a:ext>
+              </a:extLst>
+            </p:cNvPr>
+            <p:cNvSpPr/>
+            <p:nvPr/>
+          </p:nvSpPr>
+          <p:spPr>
+            <a:xfrm>
+              <a:off x="393700" y="417565"/>
+              <a:ext cx="1085554" cy="461665"/>
+            </a:xfrm>
+            <a:prstGeom prst="rect">
+              <a:avLst/>
+            </a:prstGeom>
+          </p:spPr>
+          <p:txBody>
+            <a:bodyPr wrap="none">
+              <a:spAutoFit/>
+            </a:bodyPr>
+            <a:lstStyle/>
+            <a:p>
+              <a:r>
+                <a:rPr lang="en-US" sz="1200" dirty="0" err="1"/>
+                <a:t>observeEvent</a:t>
+              </a:r>
+              <a:r>
+                <a:rPr lang="en-US" sz="1200" dirty="0"/>
+                <a:t>:</a:t>
+              </a:r>
+            </a:p>
+            <a:p>
+              <a:r>
+                <a:rPr lang="en-US" sz="1200" dirty="0" err="1"/>
+                <a:t>input$id.col</a:t>
+              </a:r>
+              <a:endParaRPr lang="en-US" sz="1200" dirty="0"/>
+            </a:p>
+          </p:txBody>
+        </p:sp>
+      </p:grpSp>
+      <p:grpSp>
+        <p:nvGrpSpPr>
+          <p:cNvPr id="14" name="Group 13">
+            <a:extLst>
+              <a:ext uri="{FF2B5EF4-FFF2-40B4-BE49-F238E27FC236}">
+                <a16:creationId xmlns:a16="http://schemas.microsoft.com/office/drawing/2014/main" id="{6A165FB7-43BF-4163-94A4-5782A982E8B0}"/>
+              </a:ext>
+            </a:extLst>
+          </p:cNvPr>
+          <p:cNvGrpSpPr/>
+          <p:nvPr/>
+        </p:nvGrpSpPr>
+        <p:grpSpPr>
+          <a:xfrm>
+            <a:off x="2586277" y="5843988"/>
+            <a:ext cx="1364760" cy="1355125"/>
+            <a:chOff x="393700" y="417565"/>
+            <a:chExt cx="1364760" cy="1014604"/>
+          </a:xfrm>
+        </p:grpSpPr>
+        <p:sp>
+          <p:nvSpPr>
+            <p:cNvPr id="15" name="Rectangle 14">
+              <a:extLst>
+                <a:ext uri="{FF2B5EF4-FFF2-40B4-BE49-F238E27FC236}">
+                  <a16:creationId xmlns:a16="http://schemas.microsoft.com/office/drawing/2014/main" id="{5B927FF8-D51E-469A-8327-6024CB67E6AA}"/>
+                </a:ext>
+              </a:extLst>
+            </p:cNvPr>
+            <p:cNvSpPr/>
+            <p:nvPr/>
+          </p:nvSpPr>
+          <p:spPr>
+            <a:xfrm>
+              <a:off x="504091" y="775676"/>
+              <a:ext cx="1254369" cy="656493"/>
+            </a:xfrm>
+            <a:prstGeom prst="rect">
+              <a:avLst/>
+            </a:prstGeom>
+          </p:spPr>
+          <p:style>
+            <a:lnRef idx="2">
+              <a:schemeClr val="accent1">
+                <a:shade val="50000"/>
+              </a:schemeClr>
+            </a:lnRef>
+            <a:fillRef idx="1">
+              <a:schemeClr val="accent1"/>
+            </a:fillRef>
+            <a:effectRef idx="0">
+              <a:schemeClr val="accent1"/>
+            </a:effectRef>
+            <a:fontRef idx="minor">
+              <a:schemeClr val="lt1"/>
+            </a:fontRef>
+          </p:style>
+          <p:txBody>
+            <a:bodyPr rtlCol="0" anchor="ctr"/>
+            <a:lstStyle/>
+            <a:p>
+              <a:pPr marL="171450" indent="-171450">
+                <a:buFontTx/>
+                <a:buChar char="-"/>
+              </a:pPr>
+              <a:r>
+                <a:rPr lang="en-US" sz="1200" dirty="0"/>
+                <a:t>Log transform</a:t>
+              </a:r>
+            </a:p>
+            <a:p>
+              <a:pPr marL="171450" indent="-171450">
+                <a:buFontTx/>
+                <a:buChar char="-"/>
+              </a:pPr>
+              <a:r>
+                <a:rPr lang="en-US" sz="1200" dirty="0"/>
+                <a:t>Normalization</a:t>
+              </a:r>
+            </a:p>
+            <a:p>
+              <a:pPr marL="171450" indent="-171450">
+                <a:buFontTx/>
+                <a:buChar char="-"/>
+              </a:pPr>
+              <a:r>
+                <a:rPr lang="en-US" sz="1200" dirty="0"/>
+                <a:t>Filter</a:t>
+              </a:r>
+            </a:p>
+            <a:p>
+              <a:pPr marL="171450" indent="-171450">
+                <a:buFontTx/>
+                <a:buChar char="-"/>
+              </a:pPr>
+              <a:r>
+                <a:rPr lang="en-US" sz="1200" dirty="0"/>
+                <a:t>test</a:t>
+              </a:r>
+            </a:p>
+          </p:txBody>
+        </p:sp>
+        <p:sp>
+          <p:nvSpPr>
+            <p:cNvPr id="16" name="Rectangle 15">
+              <a:extLst>
+                <a:ext uri="{FF2B5EF4-FFF2-40B4-BE49-F238E27FC236}">
+                  <a16:creationId xmlns:a16="http://schemas.microsoft.com/office/drawing/2014/main" id="{3784A40C-1B8C-4B25-B28C-852E4A836496}"/>
+                </a:ext>
+              </a:extLst>
+            </p:cNvPr>
+            <p:cNvSpPr/>
+            <p:nvPr/>
+          </p:nvSpPr>
+          <p:spPr>
+            <a:xfrm>
+              <a:off x="393700" y="417565"/>
+              <a:ext cx="1070229" cy="461665"/>
+            </a:xfrm>
+            <a:prstGeom prst="rect">
+              <a:avLst/>
+            </a:prstGeom>
+          </p:spPr>
+          <p:txBody>
+            <a:bodyPr wrap="none">
+              <a:spAutoFit/>
+            </a:bodyPr>
+            <a:lstStyle/>
+            <a:p>
+              <a:r>
+                <a:rPr lang="en-US" sz="1200" dirty="0" err="1"/>
+                <a:t>observeEvent</a:t>
+              </a:r>
+              <a:r>
+                <a:rPr lang="en-US" sz="1200" dirty="0"/>
+                <a:t>:</a:t>
+              </a:r>
+            </a:p>
+            <a:p>
+              <a:r>
+                <a:rPr lang="en-US" sz="1200" dirty="0" err="1"/>
+                <a:t>input$run.test</a:t>
+              </a:r>
+              <a:endParaRPr lang="en-US" sz="1200" dirty="0"/>
+            </a:p>
+          </p:txBody>
+        </p:sp>
+      </p:grpSp>
+      <p:grpSp>
+        <p:nvGrpSpPr>
+          <p:cNvPr id="17" name="Group 16">
+            <a:extLst>
+              <a:ext uri="{FF2B5EF4-FFF2-40B4-BE49-F238E27FC236}">
+                <a16:creationId xmlns:a16="http://schemas.microsoft.com/office/drawing/2014/main" id="{89671C8E-06AB-407B-BFFE-6FF29A347F51}"/>
+              </a:ext>
+            </a:extLst>
+          </p:cNvPr>
+          <p:cNvGrpSpPr/>
+          <p:nvPr/>
+        </p:nvGrpSpPr>
+        <p:grpSpPr>
+          <a:xfrm>
+            <a:off x="3166519" y="10142379"/>
+            <a:ext cx="1453090" cy="1355125"/>
+            <a:chOff x="393700" y="417565"/>
+            <a:chExt cx="1453090" cy="1014604"/>
+          </a:xfrm>
+        </p:grpSpPr>
+        <p:sp>
+          <p:nvSpPr>
+            <p:cNvPr id="18" name="Rectangle 17">
+              <a:extLst>
+                <a:ext uri="{FF2B5EF4-FFF2-40B4-BE49-F238E27FC236}">
+                  <a16:creationId xmlns:a16="http://schemas.microsoft.com/office/drawing/2014/main" id="{3502495B-62FD-4D1E-B24B-FCA2478ED599}"/>
+                </a:ext>
+              </a:extLst>
+            </p:cNvPr>
+            <p:cNvSpPr/>
+            <p:nvPr/>
+          </p:nvSpPr>
+          <p:spPr>
+            <a:xfrm>
+              <a:off x="504091" y="775676"/>
+              <a:ext cx="1254369" cy="656493"/>
+            </a:xfrm>
+            <a:prstGeom prst="rect">
+              <a:avLst/>
+            </a:prstGeom>
+          </p:spPr>
+          <p:style>
+            <a:lnRef idx="2">
+              <a:schemeClr val="accent1">
+                <a:shade val="50000"/>
+              </a:schemeClr>
+            </a:lnRef>
+            <a:fillRef idx="1">
+              <a:schemeClr val="accent1"/>
+            </a:fillRef>
+            <a:effectRef idx="0">
+              <a:schemeClr val="accent1"/>
+            </a:effectRef>
+            <a:fontRef idx="minor">
+              <a:schemeClr val="lt1"/>
+            </a:fontRef>
+          </p:style>
+          <p:txBody>
+            <a:bodyPr rtlCol="0" anchor="ctr"/>
+            <a:lstStyle/>
+            <a:p>
+              <a:pPr marL="171450" indent="-171450">
+                <a:buFontTx/>
+                <a:buChar char="-"/>
+              </a:pPr>
+              <a:r>
+                <a:rPr lang="en-US" sz="1200" dirty="0"/>
+                <a:t>Export selected </a:t>
+              </a:r>
+              <a:r>
+                <a:rPr lang="en-US" sz="1200" dirty="0" err="1"/>
+                <a:t>resuts</a:t>
+              </a:r>
+              <a:endParaRPr lang="en-US" sz="1200" dirty="0"/>
+            </a:p>
+            <a:p>
+              <a:pPr marL="171450" indent="-171450">
+                <a:buFontTx/>
+                <a:buChar char="-"/>
+              </a:pPr>
+              <a:r>
+                <a:rPr lang="en-US" sz="1200" dirty="0"/>
+                <a:t>Zip archive</a:t>
+              </a:r>
+            </a:p>
+          </p:txBody>
+        </p:sp>
+        <p:sp>
+          <p:nvSpPr>
+            <p:cNvPr id="19" name="Rectangle 18">
+              <a:extLst>
+                <a:ext uri="{FF2B5EF4-FFF2-40B4-BE49-F238E27FC236}">
+                  <a16:creationId xmlns:a16="http://schemas.microsoft.com/office/drawing/2014/main" id="{E5AD7541-B207-470F-9BBF-524905B5523C}"/>
+                </a:ext>
+              </a:extLst>
+            </p:cNvPr>
+            <p:cNvSpPr/>
+            <p:nvPr/>
+          </p:nvSpPr>
+          <p:spPr>
+            <a:xfrm>
+              <a:off x="393700" y="417565"/>
+              <a:ext cx="1453090" cy="345656"/>
+            </a:xfrm>
+            <a:prstGeom prst="rect">
+              <a:avLst/>
+            </a:prstGeom>
+          </p:spPr>
+          <p:txBody>
+            <a:bodyPr wrap="none">
+              <a:spAutoFit/>
+            </a:bodyPr>
+            <a:lstStyle/>
+            <a:p>
+              <a:r>
+                <a:rPr lang="en-US" sz="1200" dirty="0" err="1"/>
+                <a:t>observeEvent</a:t>
+              </a:r>
+              <a:r>
+                <a:rPr lang="en-US" sz="1200" dirty="0"/>
+                <a:t>:</a:t>
+              </a:r>
+            </a:p>
+            <a:p>
+              <a:r>
+                <a:rPr lang="en-US" sz="1200" dirty="0" err="1"/>
+                <a:t>input$export.results</a:t>
+              </a:r>
+              <a:endParaRPr lang="en-US" sz="1200" dirty="0"/>
+            </a:p>
+          </p:txBody>
+        </p:sp>
+      </p:grpSp>
+      <p:grpSp>
+        <p:nvGrpSpPr>
+          <p:cNvPr id="21" name="Group 20">
+            <a:extLst>
+              <a:ext uri="{FF2B5EF4-FFF2-40B4-BE49-F238E27FC236}">
+                <a16:creationId xmlns:a16="http://schemas.microsoft.com/office/drawing/2014/main" id="{A431A83D-C218-4265-92D4-2917EFB0CC6E}"/>
+              </a:ext>
+            </a:extLst>
+          </p:cNvPr>
+          <p:cNvGrpSpPr/>
+          <p:nvPr/>
+        </p:nvGrpSpPr>
+        <p:grpSpPr>
+          <a:xfrm>
+            <a:off x="21560" y="5257382"/>
+            <a:ext cx="1364760" cy="1404390"/>
+            <a:chOff x="393700" y="417565"/>
+            <a:chExt cx="1364760" cy="1404390"/>
+          </a:xfrm>
+        </p:grpSpPr>
+        <p:sp>
+          <p:nvSpPr>
+            <p:cNvPr id="22" name="Rectangle 21">
+              <a:extLst>
+                <a:ext uri="{FF2B5EF4-FFF2-40B4-BE49-F238E27FC236}">
+                  <a16:creationId xmlns:a16="http://schemas.microsoft.com/office/drawing/2014/main" id="{E9965BE3-D4E8-4D5A-86C7-EEB4A2206BFE}"/>
+                </a:ext>
+              </a:extLst>
+            </p:cNvPr>
+            <p:cNvSpPr/>
+            <p:nvPr/>
+          </p:nvSpPr>
+          <p:spPr>
+            <a:xfrm>
+              <a:off x="504091" y="879230"/>
+              <a:ext cx="1254369" cy="942725"/>
+            </a:xfrm>
+            <a:prstGeom prst="rect">
+              <a:avLst/>
+            </a:prstGeom>
+          </p:spPr>
+          <p:style>
+            <a:lnRef idx="2">
+              <a:schemeClr val="accent2">
+                <a:shade val="50000"/>
+              </a:schemeClr>
+            </a:lnRef>
+            <a:fillRef idx="1">
+              <a:schemeClr val="accent2"/>
+            </a:fillRef>
+            <a:effectRef idx="0">
+              <a:schemeClr val="accent2"/>
+            </a:effectRef>
+            <a:fontRef idx="minor">
+              <a:schemeClr val="lt1"/>
+            </a:fontRef>
+          </p:style>
+          <p:txBody>
+            <a:bodyPr rtlCol="0" anchor="ctr"/>
+            <a:lstStyle/>
+            <a:p>
+              <a:pPr algn="ctr"/>
+              <a:r>
+                <a:rPr lang="en-US" sz="1200" dirty="0"/>
+                <a:t>-set up analysis</a:t>
+              </a:r>
+            </a:p>
+            <a:p>
+              <a:pPr algn="ctr"/>
+              <a:endParaRPr lang="en-US" sz="1200" dirty="0"/>
+            </a:p>
+            <a:p>
+              <a:pPr algn="ctr"/>
+              <a:r>
+                <a:rPr lang="en-US" sz="1200" b="1" dirty="0" err="1">
+                  <a:solidFill>
+                    <a:schemeClr val="accent6">
+                      <a:lumMod val="60000"/>
+                      <a:lumOff val="40000"/>
+                    </a:schemeClr>
+                  </a:solidFill>
+                </a:rPr>
+                <a:t>actionButton</a:t>
+              </a:r>
+              <a:r>
+                <a:rPr lang="en-US" sz="1200" b="1" dirty="0">
+                  <a:solidFill>
+                    <a:schemeClr val="accent6">
+                      <a:lumMod val="60000"/>
+                      <a:lumOff val="40000"/>
+                    </a:schemeClr>
+                  </a:solidFill>
+                </a:rPr>
+                <a:t>: </a:t>
+              </a:r>
+              <a:r>
+                <a:rPr lang="en-US" sz="1200" b="1" dirty="0" err="1">
+                  <a:solidFill>
+                    <a:schemeClr val="accent6">
+                      <a:lumMod val="60000"/>
+                      <a:lumOff val="40000"/>
+                    </a:schemeClr>
+                  </a:solidFill>
+                </a:rPr>
+                <a:t>run.test</a:t>
+              </a:r>
+              <a:endParaRPr lang="en-US" sz="1200" b="1" dirty="0">
+                <a:solidFill>
+                  <a:schemeClr val="accent6">
+                    <a:lumMod val="60000"/>
+                    <a:lumOff val="40000"/>
+                  </a:schemeClr>
+                </a:solidFill>
+              </a:endParaRPr>
+            </a:p>
+          </p:txBody>
+        </p:sp>
+        <p:sp>
+          <p:nvSpPr>
+            <p:cNvPr id="23" name="Rectangle 22">
+              <a:extLst>
+                <a:ext uri="{FF2B5EF4-FFF2-40B4-BE49-F238E27FC236}">
+                  <a16:creationId xmlns:a16="http://schemas.microsoft.com/office/drawing/2014/main" id="{1FCD9AF6-79B6-4E92-8997-A236B966FA8F}"/>
+                </a:ext>
+              </a:extLst>
+            </p:cNvPr>
+            <p:cNvSpPr/>
+            <p:nvPr/>
+          </p:nvSpPr>
+          <p:spPr>
+            <a:xfrm>
+              <a:off x="393700" y="417565"/>
+              <a:ext cx="1333891" cy="461665"/>
+            </a:xfrm>
+            <a:prstGeom prst="rect">
+              <a:avLst/>
+            </a:prstGeom>
+          </p:spPr>
+          <p:txBody>
+            <a:bodyPr wrap="none">
+              <a:spAutoFit/>
+            </a:bodyPr>
+            <a:lstStyle/>
+            <a:p>
+              <a:r>
+                <a:rPr lang="en-US" sz="1200" dirty="0" err="1"/>
+                <a:t>renderUI</a:t>
+              </a:r>
+              <a:r>
+                <a:rPr lang="en-US" sz="1200" dirty="0"/>
+                <a:t>:</a:t>
+              </a:r>
+            </a:p>
+            <a:p>
+              <a:r>
+                <a:rPr lang="en-US" sz="1200" dirty="0" err="1"/>
+                <a:t>output$list.groups</a:t>
+              </a:r>
+              <a:endParaRPr lang="en-US" sz="1200" dirty="0"/>
+            </a:p>
+          </p:txBody>
+        </p:sp>
+      </p:grpSp>
+      <p:grpSp>
+        <p:nvGrpSpPr>
+          <p:cNvPr id="33" name="Group 32">
+            <a:extLst>
+              <a:ext uri="{FF2B5EF4-FFF2-40B4-BE49-F238E27FC236}">
+                <a16:creationId xmlns:a16="http://schemas.microsoft.com/office/drawing/2014/main" id="{C703CE1D-6B02-4D6F-8FEE-17FD16C6B6F1}"/>
+              </a:ext>
+            </a:extLst>
+          </p:cNvPr>
+          <p:cNvGrpSpPr/>
+          <p:nvPr/>
+        </p:nvGrpSpPr>
+        <p:grpSpPr>
+          <a:xfrm>
+            <a:off x="155958" y="7897403"/>
+            <a:ext cx="1681055" cy="2058077"/>
+            <a:chOff x="130024" y="2758472"/>
+            <a:chExt cx="1681055" cy="2058077"/>
+          </a:xfrm>
+        </p:grpSpPr>
+        <p:grpSp>
+          <p:nvGrpSpPr>
+            <p:cNvPr id="25" name="Group 24">
+              <a:extLst>
+                <a:ext uri="{FF2B5EF4-FFF2-40B4-BE49-F238E27FC236}">
+                  <a16:creationId xmlns:a16="http://schemas.microsoft.com/office/drawing/2014/main" id="{E2168BD4-16B0-45DE-BE6C-C01C51F6E6A5}"/>
+                </a:ext>
+              </a:extLst>
+            </p:cNvPr>
+            <p:cNvGrpSpPr/>
+            <p:nvPr/>
+          </p:nvGrpSpPr>
+          <p:grpSpPr>
+            <a:xfrm>
+              <a:off x="130024" y="2758472"/>
+              <a:ext cx="1532199" cy="1175575"/>
+              <a:chOff x="393700" y="417565"/>
+              <a:chExt cx="1532199" cy="1175575"/>
+            </a:xfrm>
+          </p:grpSpPr>
+          <p:sp>
+            <p:nvSpPr>
+              <p:cNvPr id="26" name="Rectangle 25">
+                <a:extLst>
+                  <a:ext uri="{FF2B5EF4-FFF2-40B4-BE49-F238E27FC236}">
+                    <a16:creationId xmlns:a16="http://schemas.microsoft.com/office/drawing/2014/main" id="{01C84692-29ED-4795-9C3B-9CC11B02987C}"/>
+                  </a:ext>
+                </a:extLst>
+              </p:cNvPr>
+              <p:cNvSpPr/>
+              <p:nvPr/>
+            </p:nvSpPr>
+            <p:spPr>
+              <a:xfrm>
+                <a:off x="504091" y="879230"/>
+                <a:ext cx="1421808" cy="713910"/>
+              </a:xfrm>
+              <a:prstGeom prst="rect">
+                <a:avLst/>
+              </a:prstGeom>
+            </p:spPr>
+            <p:style>
+              <a:lnRef idx="2">
+                <a:schemeClr val="accent2">
+                  <a:shade val="50000"/>
+                </a:schemeClr>
+              </a:lnRef>
+              <a:fillRef idx="1">
+                <a:schemeClr val="accent2"/>
+              </a:fillRef>
+              <a:effectRef idx="0">
+                <a:schemeClr val="accent2"/>
+              </a:effectRef>
+              <a:fontRef idx="minor">
+                <a:schemeClr val="lt1"/>
+              </a:fontRef>
+            </p:style>
+            <p:txBody>
+              <a:bodyPr rtlCol="0" anchor="ctr"/>
+              <a:lstStyle/>
+              <a:p>
+                <a:r>
+                  <a:rPr lang="en-US" sz="1200" dirty="0"/>
+                  <a:t>Global results filter</a:t>
+                </a:r>
+              </a:p>
+              <a:p>
+                <a:endParaRPr lang="en-US" sz="1200" dirty="0"/>
+              </a:p>
+              <a:p>
+                <a:r>
+                  <a:rPr lang="en-US" sz="1200" b="1" dirty="0">
+                    <a:solidFill>
+                      <a:schemeClr val="accent6">
+                        <a:lumMod val="60000"/>
+                        <a:lumOff val="40000"/>
+                      </a:schemeClr>
+                    </a:solidFill>
+                  </a:rPr>
+                  <a:t>Button: </a:t>
+                </a:r>
+                <a:r>
+                  <a:rPr lang="en-US" sz="1200" b="1" dirty="0" err="1">
+                    <a:solidFill>
+                      <a:schemeClr val="accent6">
+                        <a:lumMod val="60000"/>
+                        <a:lumOff val="40000"/>
+                      </a:schemeClr>
+                    </a:solidFill>
+                  </a:rPr>
+                  <a:t>filter.type</a:t>
+                </a:r>
+                <a:endParaRPr lang="en-US" sz="1200" b="1" dirty="0">
+                  <a:solidFill>
+                    <a:schemeClr val="accent6">
+                      <a:lumMod val="60000"/>
+                      <a:lumOff val="40000"/>
+                    </a:schemeClr>
+                  </a:solidFill>
+                </a:endParaRPr>
+              </a:p>
+              <a:p>
+                <a:r>
+                  <a:rPr lang="en-US" sz="1200" b="1" dirty="0">
+                    <a:solidFill>
+                      <a:schemeClr val="accent6">
+                        <a:lumMod val="60000"/>
+                        <a:lumOff val="40000"/>
+                      </a:schemeClr>
+                    </a:solidFill>
+                  </a:rPr>
+                  <a:t>Button: </a:t>
+                </a:r>
+                <a:r>
+                  <a:rPr lang="en-US" sz="1200" b="1" dirty="0" err="1">
+                    <a:solidFill>
+                      <a:schemeClr val="accent6">
+                        <a:lumMod val="60000"/>
+                        <a:lumOff val="40000"/>
+                      </a:schemeClr>
+                    </a:solidFill>
+                  </a:rPr>
+                  <a:t>filter.value</a:t>
+                </a:r>
+                <a:endParaRPr lang="en-US" sz="1200" b="1" dirty="0">
+                  <a:solidFill>
+                    <a:schemeClr val="accent6">
+                      <a:lumMod val="60000"/>
+                      <a:lumOff val="40000"/>
+                    </a:schemeClr>
+                  </a:solidFill>
+                </a:endParaRPr>
+              </a:p>
+            </p:txBody>
+          </p:sp>
+          <p:sp>
+            <p:nvSpPr>
+              <p:cNvPr id="27" name="Rectangle 26">
+                <a:extLst>
+                  <a:ext uri="{FF2B5EF4-FFF2-40B4-BE49-F238E27FC236}">
+                    <a16:creationId xmlns:a16="http://schemas.microsoft.com/office/drawing/2014/main" id="{A686CDFA-5622-46FE-8B9F-30115351471E}"/>
+                  </a:ext>
+                </a:extLst>
+              </p:cNvPr>
+              <p:cNvSpPr/>
+              <p:nvPr/>
+            </p:nvSpPr>
+            <p:spPr>
+              <a:xfrm>
+                <a:off x="393700" y="417565"/>
+                <a:ext cx="1281505" cy="461665"/>
+              </a:xfrm>
+              <a:prstGeom prst="rect">
+                <a:avLst/>
+              </a:prstGeom>
+            </p:spPr>
+            <p:txBody>
+              <a:bodyPr wrap="none">
+                <a:spAutoFit/>
+              </a:bodyPr>
+              <a:lstStyle/>
+              <a:p>
+                <a:r>
+                  <a:rPr lang="en-US" sz="1200" dirty="0" err="1"/>
+                  <a:t>renderUI</a:t>
+                </a:r>
+                <a:r>
+                  <a:rPr lang="en-US" sz="1200" dirty="0"/>
+                  <a:t>:</a:t>
+                </a:r>
+              </a:p>
+              <a:p>
+                <a:r>
+                  <a:rPr lang="en-US" sz="1200" dirty="0" err="1"/>
+                  <a:t>output$filter.type</a:t>
+                </a:r>
+                <a:endParaRPr lang="en-US" sz="1200" dirty="0"/>
+              </a:p>
+            </p:txBody>
+          </p:sp>
+        </p:grpSp>
+        <p:grpSp>
+          <p:nvGrpSpPr>
+            <p:cNvPr id="29" name="Group 28">
+              <a:extLst>
+                <a:ext uri="{FF2B5EF4-FFF2-40B4-BE49-F238E27FC236}">
+                  <a16:creationId xmlns:a16="http://schemas.microsoft.com/office/drawing/2014/main" id="{6B182E16-A3DF-4DD1-98F1-8182B5E203D1}"/>
+                </a:ext>
+              </a:extLst>
+            </p:cNvPr>
+            <p:cNvGrpSpPr/>
+            <p:nvPr/>
+          </p:nvGrpSpPr>
+          <p:grpSpPr>
+            <a:xfrm>
+              <a:off x="167646" y="3934047"/>
+              <a:ext cx="1532199" cy="847060"/>
+              <a:chOff x="393700" y="417565"/>
+              <a:chExt cx="1532199" cy="847060"/>
+            </a:xfrm>
+          </p:grpSpPr>
+          <p:sp>
+            <p:nvSpPr>
+              <p:cNvPr id="30" name="Rectangle 29">
+                <a:extLst>
+                  <a:ext uri="{FF2B5EF4-FFF2-40B4-BE49-F238E27FC236}">
+                    <a16:creationId xmlns:a16="http://schemas.microsoft.com/office/drawing/2014/main" id="{90C8B9E9-069B-4187-849A-46A17A2555D6}"/>
+                  </a:ext>
+                </a:extLst>
+              </p:cNvPr>
+              <p:cNvSpPr/>
+              <p:nvPr/>
+            </p:nvSpPr>
+            <p:spPr>
+              <a:xfrm>
+                <a:off x="504091" y="879230"/>
+                <a:ext cx="1421808" cy="385395"/>
+              </a:xfrm>
+              <a:prstGeom prst="rect">
+                <a:avLst/>
+              </a:prstGeom>
+            </p:spPr>
+            <p:style>
+              <a:lnRef idx="2">
+                <a:schemeClr val="accent2">
+                  <a:shade val="50000"/>
+                </a:schemeClr>
+              </a:lnRef>
+              <a:fillRef idx="1">
+                <a:schemeClr val="accent2"/>
+              </a:fillRef>
+              <a:effectRef idx="0">
+                <a:schemeClr val="accent2"/>
+              </a:effectRef>
+              <a:fontRef idx="minor">
+                <a:schemeClr val="lt1"/>
+              </a:fontRef>
+            </p:style>
+            <p:txBody>
+              <a:bodyPr rtlCol="0" anchor="ctr"/>
+              <a:lstStyle/>
+              <a:p>
+                <a:r>
+                  <a:rPr lang="en-US" sz="1200" dirty="0"/>
+                  <a:t>Set default values for </a:t>
+                </a:r>
+                <a:r>
+                  <a:rPr lang="en-US" sz="1200" dirty="0" err="1">
+                    <a:solidFill>
+                      <a:schemeClr val="accent6">
+                        <a:lumMod val="60000"/>
+                        <a:lumOff val="40000"/>
+                      </a:schemeClr>
+                    </a:solidFill>
+                  </a:rPr>
+                  <a:t>filter.type</a:t>
+                </a:r>
+                <a:endParaRPr lang="en-US" sz="1200" dirty="0">
+                  <a:solidFill>
+                    <a:schemeClr val="accent6">
+                      <a:lumMod val="60000"/>
+                      <a:lumOff val="40000"/>
+                    </a:schemeClr>
+                  </a:solidFill>
+                </a:endParaRPr>
+              </a:p>
+            </p:txBody>
+          </p:sp>
+          <p:sp>
+            <p:nvSpPr>
+              <p:cNvPr id="31" name="Rectangle 30">
+                <a:extLst>
+                  <a:ext uri="{FF2B5EF4-FFF2-40B4-BE49-F238E27FC236}">
+                    <a16:creationId xmlns:a16="http://schemas.microsoft.com/office/drawing/2014/main" id="{90E94B08-39FE-4DDA-9647-466530CF4CD1}"/>
+                  </a:ext>
+                </a:extLst>
+              </p:cNvPr>
+              <p:cNvSpPr/>
+              <p:nvPr/>
+            </p:nvSpPr>
+            <p:spPr>
+              <a:xfrm>
+                <a:off x="393700" y="417565"/>
+                <a:ext cx="1334533" cy="461665"/>
+              </a:xfrm>
+              <a:prstGeom prst="rect">
+                <a:avLst/>
+              </a:prstGeom>
+            </p:spPr>
+            <p:txBody>
+              <a:bodyPr wrap="none">
+                <a:spAutoFit/>
+              </a:bodyPr>
+              <a:lstStyle/>
+              <a:p>
+                <a:r>
+                  <a:rPr lang="en-US" sz="1200" dirty="0" err="1"/>
+                  <a:t>renderUI</a:t>
+                </a:r>
+                <a:r>
+                  <a:rPr lang="en-US" sz="1200" dirty="0"/>
+                  <a:t>:</a:t>
+                </a:r>
+              </a:p>
+              <a:p>
+                <a:r>
+                  <a:rPr lang="en-US" sz="1200" dirty="0" err="1"/>
+                  <a:t>output$filter.value</a:t>
+                </a:r>
+                <a:endParaRPr lang="en-US" sz="1200" dirty="0"/>
+              </a:p>
+            </p:txBody>
+          </p:sp>
+        </p:grpSp>
+        <p:sp>
+          <p:nvSpPr>
+            <p:cNvPr id="32" name="Rectangle 31">
+              <a:extLst>
+                <a:ext uri="{FF2B5EF4-FFF2-40B4-BE49-F238E27FC236}">
+                  <a16:creationId xmlns:a16="http://schemas.microsoft.com/office/drawing/2014/main" id="{733997BF-7FE6-448F-9AC5-182704D36CE2}"/>
+                </a:ext>
+              </a:extLst>
+            </p:cNvPr>
+            <p:cNvSpPr/>
+            <p:nvPr/>
+          </p:nvSpPr>
+          <p:spPr>
+            <a:xfrm>
+              <a:off x="167646" y="2799907"/>
+              <a:ext cx="1643433" cy="2016642"/>
+            </a:xfrm>
+            <a:prstGeom prst="rect">
+              <a:avLst/>
+            </a:prstGeom>
+            <a:noFill/>
+          </p:spPr>
+          <p:style>
+            <a:lnRef idx="2">
+              <a:schemeClr val="accent1">
+                <a:shade val="50000"/>
+              </a:schemeClr>
+            </a:lnRef>
+            <a:fillRef idx="1">
+              <a:schemeClr val="accent1"/>
+            </a:fillRef>
+            <a:effectRef idx="0">
+              <a:schemeClr val="accent1"/>
+            </a:effectRef>
+            <a:fontRef idx="minor">
+              <a:schemeClr val="lt1"/>
+            </a:fontRef>
+          </p:style>
+          <p:txBody>
+            <a:bodyPr rtlCol="0" anchor="ctr"/>
+            <a:lstStyle/>
+            <a:p>
+              <a:pPr algn="ctr"/>
+              <a:endParaRPr lang="en-US"/>
+            </a:p>
+          </p:txBody>
+        </p:sp>
+      </p:grpSp>
+      <p:grpSp>
+        <p:nvGrpSpPr>
+          <p:cNvPr id="34" name="Group 33">
+            <a:extLst>
+              <a:ext uri="{FF2B5EF4-FFF2-40B4-BE49-F238E27FC236}">
+                <a16:creationId xmlns:a16="http://schemas.microsoft.com/office/drawing/2014/main" id="{1DC29C0F-CBDF-42F4-9C4A-AABAF5018F40}"/>
+              </a:ext>
+            </a:extLst>
+          </p:cNvPr>
+          <p:cNvGrpSpPr/>
+          <p:nvPr/>
+        </p:nvGrpSpPr>
+        <p:grpSpPr>
+          <a:xfrm>
+            <a:off x="-1969" y="3756513"/>
+            <a:ext cx="1674281" cy="1211855"/>
+            <a:chOff x="393700" y="417565"/>
+            <a:chExt cx="1547475" cy="1118158"/>
+          </a:xfrm>
+        </p:grpSpPr>
+        <p:sp>
+          <p:nvSpPr>
+            <p:cNvPr id="35" name="Rectangle 34">
+              <a:extLst>
+                <a:ext uri="{FF2B5EF4-FFF2-40B4-BE49-F238E27FC236}">
+                  <a16:creationId xmlns:a16="http://schemas.microsoft.com/office/drawing/2014/main" id="{5689CEAA-1143-4491-B62F-D549A08BE177}"/>
+                </a:ext>
+              </a:extLst>
+            </p:cNvPr>
+            <p:cNvSpPr/>
+            <p:nvPr/>
+          </p:nvSpPr>
+          <p:spPr>
+            <a:xfrm>
+              <a:off x="504091" y="879230"/>
+              <a:ext cx="1372662" cy="656493"/>
+            </a:xfrm>
+            <a:prstGeom prst="rect">
+              <a:avLst/>
+            </a:prstGeom>
+          </p:spPr>
+          <p:style>
+            <a:lnRef idx="2">
+              <a:schemeClr val="accent2">
+                <a:shade val="50000"/>
+              </a:schemeClr>
+            </a:lnRef>
+            <a:fillRef idx="1">
+              <a:schemeClr val="accent2"/>
+            </a:fillRef>
+            <a:effectRef idx="0">
+              <a:schemeClr val="accent2"/>
+            </a:effectRef>
+            <a:fontRef idx="minor">
+              <a:schemeClr val="lt1"/>
+            </a:fontRef>
+          </p:style>
+          <p:txBody>
+            <a:bodyPr rtlCol="0" anchor="ctr"/>
+            <a:lstStyle/>
+            <a:p>
+              <a:r>
+                <a:rPr lang="en-US" sz="1200" b="1" dirty="0" err="1">
+                  <a:solidFill>
+                    <a:schemeClr val="accent6">
+                      <a:lumMod val="60000"/>
+                      <a:lumOff val="40000"/>
+                    </a:schemeClr>
+                  </a:solidFill>
+                </a:rPr>
+                <a:t>fileInput</a:t>
+              </a:r>
+              <a:r>
+                <a:rPr lang="en-US" sz="1200" b="1" dirty="0">
+                  <a:solidFill>
+                    <a:schemeClr val="accent6">
+                      <a:lumMod val="60000"/>
+                      <a:lumOff val="40000"/>
+                    </a:schemeClr>
+                  </a:solidFill>
+                </a:rPr>
+                <a:t>: </a:t>
+              </a:r>
+              <a:r>
+                <a:rPr lang="en-US" sz="1200" b="1" dirty="0" err="1">
+                  <a:solidFill>
+                    <a:schemeClr val="accent6">
+                      <a:lumMod val="60000"/>
+                      <a:lumOff val="40000"/>
+                    </a:schemeClr>
+                  </a:solidFill>
+                </a:rPr>
+                <a:t>exp.file</a:t>
+              </a:r>
+              <a:endParaRPr lang="en-US" sz="1200" b="1" dirty="0">
+                <a:solidFill>
+                  <a:schemeClr val="accent6">
+                    <a:lumMod val="60000"/>
+                    <a:lumOff val="40000"/>
+                  </a:schemeClr>
+                </a:solidFill>
+              </a:endParaRPr>
+            </a:p>
+            <a:p>
+              <a:r>
+                <a:rPr lang="en-US" sz="1200" b="1" dirty="0" err="1">
+                  <a:solidFill>
+                    <a:schemeClr val="accent6">
+                      <a:lumMod val="60000"/>
+                      <a:lumOff val="40000"/>
+                    </a:schemeClr>
+                  </a:solidFill>
+                </a:rPr>
+                <a:t>Button:update.grp</a:t>
+              </a:r>
+              <a:endParaRPr lang="en-US" sz="1200" b="1" dirty="0">
+                <a:solidFill>
+                  <a:schemeClr val="accent6">
+                    <a:lumMod val="60000"/>
+                    <a:lumOff val="40000"/>
+                  </a:schemeClr>
+                </a:solidFill>
+              </a:endParaRPr>
+            </a:p>
+          </p:txBody>
+        </p:sp>
+        <p:sp>
+          <p:nvSpPr>
+            <p:cNvPr id="36" name="Rectangle 35">
+              <a:extLst>
+                <a:ext uri="{FF2B5EF4-FFF2-40B4-BE49-F238E27FC236}">
+                  <a16:creationId xmlns:a16="http://schemas.microsoft.com/office/drawing/2014/main" id="{BD000107-8A06-417E-B973-FC50C4895A20}"/>
+                </a:ext>
+              </a:extLst>
+            </p:cNvPr>
+            <p:cNvSpPr/>
+            <p:nvPr/>
+          </p:nvSpPr>
+          <p:spPr>
+            <a:xfrm>
+              <a:off x="393700" y="417565"/>
+              <a:ext cx="1547475" cy="461665"/>
+            </a:xfrm>
+            <a:prstGeom prst="rect">
+              <a:avLst/>
+            </a:prstGeom>
+          </p:spPr>
+          <p:txBody>
+            <a:bodyPr wrap="none">
+              <a:spAutoFit/>
+            </a:bodyPr>
+            <a:lstStyle/>
+            <a:p>
+              <a:r>
+                <a:rPr lang="en-US" sz="1200" dirty="0" err="1"/>
+                <a:t>renderUI</a:t>
+              </a:r>
+              <a:r>
+                <a:rPr lang="en-US" sz="1200" dirty="0"/>
+                <a:t>:</a:t>
+              </a:r>
+            </a:p>
+            <a:p>
+              <a:r>
+                <a:rPr lang="en-US" sz="1200" dirty="0" err="1"/>
+                <a:t>output$define.groups</a:t>
+              </a:r>
+              <a:endParaRPr lang="en-US" sz="1200" dirty="0"/>
+            </a:p>
+          </p:txBody>
+        </p:sp>
+      </p:grpSp>
+      <p:cxnSp>
+        <p:nvCxnSpPr>
+          <p:cNvPr id="42" name="Straight Arrow Connector 41">
+            <a:extLst>
+              <a:ext uri="{FF2B5EF4-FFF2-40B4-BE49-F238E27FC236}">
+                <a16:creationId xmlns:a16="http://schemas.microsoft.com/office/drawing/2014/main" id="{F5FCF757-2A14-4E4F-AB69-B65F991B402F}"/>
+              </a:ext>
+            </a:extLst>
+          </p:cNvPr>
+          <p:cNvCxnSpPr>
+            <a:cxnSpLocks/>
+            <a:stCxn id="35" idx="3"/>
+            <a:endCxn id="2" idx="1"/>
+          </p:cNvCxnSpPr>
+          <p:nvPr/>
+        </p:nvCxnSpPr>
+        <p:spPr>
+          <a:xfrm>
+            <a:off x="1602611" y="4612616"/>
+            <a:ext cx="1084071" cy="647357"/>
+          </a:xfrm>
+          <a:prstGeom prst="straightConnector1">
+            <a:avLst/>
+          </a:prstGeom>
+          <a:ln>
+            <a:tailEnd type="triangle"/>
+          </a:ln>
+        </p:spPr>
+        <p:style>
+          <a:lnRef idx="1">
+            <a:schemeClr val="dk1"/>
+          </a:lnRef>
+          <a:fillRef idx="0">
+            <a:schemeClr val="dk1"/>
+          </a:fillRef>
+          <a:effectRef idx="0">
+            <a:schemeClr val="dk1"/>
+          </a:effectRef>
+          <a:fontRef idx="minor">
+            <a:schemeClr val="tx1"/>
+          </a:fontRef>
+        </p:style>
+      </p:cxnSp>
+      <p:grpSp>
+        <p:nvGrpSpPr>
+          <p:cNvPr id="44" name="Group 43">
+            <a:extLst>
+              <a:ext uri="{FF2B5EF4-FFF2-40B4-BE49-F238E27FC236}">
+                <a16:creationId xmlns:a16="http://schemas.microsoft.com/office/drawing/2014/main" id="{08F1FF11-8366-4CC3-8485-041F225D6789}"/>
+              </a:ext>
+            </a:extLst>
+          </p:cNvPr>
+          <p:cNvGrpSpPr/>
+          <p:nvPr/>
+        </p:nvGrpSpPr>
+        <p:grpSpPr>
+          <a:xfrm>
+            <a:off x="21683" y="1713586"/>
+            <a:ext cx="1792798" cy="1823068"/>
+            <a:chOff x="393700" y="417565"/>
+            <a:chExt cx="1657016" cy="1682114"/>
+          </a:xfrm>
+        </p:grpSpPr>
+        <p:sp>
+          <p:nvSpPr>
+            <p:cNvPr id="45" name="Rectangle 44">
+              <a:extLst>
+                <a:ext uri="{FF2B5EF4-FFF2-40B4-BE49-F238E27FC236}">
+                  <a16:creationId xmlns:a16="http://schemas.microsoft.com/office/drawing/2014/main" id="{EDD51A3A-7089-4E17-90DC-6C9AD9F2C200}"/>
+                </a:ext>
+              </a:extLst>
+            </p:cNvPr>
+            <p:cNvSpPr/>
+            <p:nvPr/>
+          </p:nvSpPr>
+          <p:spPr>
+            <a:xfrm>
+              <a:off x="504091" y="879229"/>
+              <a:ext cx="1372662" cy="1220450"/>
+            </a:xfrm>
+            <a:prstGeom prst="rect">
+              <a:avLst/>
+            </a:prstGeom>
+          </p:spPr>
+          <p:style>
+            <a:lnRef idx="2">
+              <a:schemeClr val="accent2">
+                <a:shade val="50000"/>
+              </a:schemeClr>
+            </a:lnRef>
+            <a:fillRef idx="1">
+              <a:schemeClr val="accent2"/>
+            </a:fillRef>
+            <a:effectRef idx="0">
+              <a:schemeClr val="accent2"/>
+            </a:effectRef>
+            <a:fontRef idx="minor">
+              <a:schemeClr val="lt1"/>
+            </a:fontRef>
+          </p:style>
+          <p:txBody>
+            <a:bodyPr rtlCol="0" anchor="ctr"/>
+            <a:lstStyle/>
+            <a:p>
+              <a:r>
+                <a:rPr lang="en-US" sz="1200" b="1" dirty="0" err="1">
+                  <a:solidFill>
+                    <a:schemeClr val="accent6">
+                      <a:lumMod val="60000"/>
+                      <a:lumOff val="40000"/>
+                    </a:schemeClr>
+                  </a:solidFill>
+                </a:rPr>
+                <a:t>downloadButton</a:t>
+              </a:r>
+              <a:r>
+                <a:rPr lang="en-US" sz="1200" b="1" dirty="0">
+                  <a:solidFill>
+                    <a:schemeClr val="accent6">
+                      <a:lumMod val="60000"/>
+                      <a:lumOff val="40000"/>
+                    </a:schemeClr>
+                  </a:solidFill>
+                </a:rPr>
+                <a:t>: </a:t>
+              </a:r>
+              <a:r>
+                <a:rPr lang="en-US" sz="1200" b="1" dirty="0" err="1">
+                  <a:solidFill>
+                    <a:schemeClr val="accent6">
+                      <a:lumMod val="60000"/>
+                      <a:lumOff val="40000"/>
+                    </a:schemeClr>
+                  </a:solidFill>
+                </a:rPr>
+                <a:t>exportTemplate</a:t>
+              </a:r>
+              <a:endParaRPr lang="en-US" sz="1200" b="1" dirty="0">
+                <a:solidFill>
+                  <a:schemeClr val="accent6">
+                    <a:lumMod val="60000"/>
+                    <a:lumOff val="40000"/>
+                  </a:schemeClr>
+                </a:solidFill>
+              </a:endParaRPr>
+            </a:p>
+            <a:p>
+              <a:endParaRPr lang="en-US" sz="1200" b="1" dirty="0">
+                <a:solidFill>
+                  <a:schemeClr val="accent6">
+                    <a:lumMod val="60000"/>
+                    <a:lumOff val="40000"/>
+                  </a:schemeClr>
+                </a:solidFill>
+              </a:endParaRPr>
+            </a:p>
+            <a:p>
+              <a:r>
+                <a:rPr lang="en-US" sz="1200" b="1" dirty="0" err="1">
+                  <a:solidFill>
+                    <a:schemeClr val="accent6">
+                      <a:lumMod val="60000"/>
+                      <a:lumOff val="40000"/>
+                    </a:schemeClr>
+                  </a:solidFill>
+                </a:rPr>
+                <a:t>radioButton</a:t>
+              </a:r>
+              <a:r>
+                <a:rPr lang="en-US" sz="1200" b="1" dirty="0">
+                  <a:solidFill>
+                    <a:schemeClr val="accent6">
+                      <a:lumMod val="60000"/>
+                      <a:lumOff val="40000"/>
+                    </a:schemeClr>
+                  </a:solidFill>
+                </a:rPr>
+                <a:t>: </a:t>
+              </a:r>
+              <a:r>
+                <a:rPr lang="en-US" sz="1200" b="1" dirty="0" err="1">
+                  <a:solidFill>
+                    <a:schemeClr val="accent6">
+                      <a:lumMod val="60000"/>
+                      <a:lumOff val="40000"/>
+                    </a:schemeClr>
+                  </a:solidFill>
+                </a:rPr>
+                <a:t>id.col.value</a:t>
+              </a:r>
+              <a:endParaRPr lang="en-US" sz="1200" b="1" dirty="0">
+                <a:solidFill>
+                  <a:schemeClr val="accent6">
+                    <a:lumMod val="60000"/>
+                    <a:lumOff val="40000"/>
+                  </a:schemeClr>
+                </a:solidFill>
+              </a:endParaRPr>
+            </a:p>
+            <a:p>
+              <a:endParaRPr lang="en-US" sz="1200" b="1" dirty="0">
+                <a:solidFill>
+                  <a:schemeClr val="accent6">
+                    <a:lumMod val="60000"/>
+                    <a:lumOff val="40000"/>
+                  </a:schemeClr>
+                </a:solidFill>
+              </a:endParaRPr>
+            </a:p>
+            <a:p>
+              <a:r>
+                <a:rPr lang="en-US" sz="1200" b="1" dirty="0" err="1">
+                  <a:solidFill>
+                    <a:schemeClr val="accent6">
+                      <a:lumMod val="60000"/>
+                      <a:lumOff val="40000"/>
+                    </a:schemeClr>
+                  </a:solidFill>
+                </a:rPr>
+                <a:t>actionButton</a:t>
+              </a:r>
+              <a:r>
+                <a:rPr lang="en-US" sz="1200" b="1" dirty="0">
+                  <a:solidFill>
+                    <a:schemeClr val="accent6">
+                      <a:lumMod val="60000"/>
+                      <a:lumOff val="40000"/>
+                    </a:schemeClr>
+                  </a:solidFill>
+                </a:rPr>
+                <a:t>: </a:t>
+              </a:r>
+              <a:r>
+                <a:rPr lang="en-US" sz="1200" b="1" dirty="0" err="1">
+                  <a:solidFill>
+                    <a:schemeClr val="accent6">
+                      <a:lumMod val="60000"/>
+                      <a:lumOff val="40000"/>
+                    </a:schemeClr>
+                  </a:solidFill>
+                </a:rPr>
+                <a:t>id.col</a:t>
+              </a:r>
+              <a:endParaRPr lang="en-US" sz="1200" b="1" dirty="0">
+                <a:solidFill>
+                  <a:schemeClr val="accent6">
+                    <a:lumMod val="60000"/>
+                    <a:lumOff val="40000"/>
+                  </a:schemeClr>
+                </a:solidFill>
+              </a:endParaRPr>
+            </a:p>
+          </p:txBody>
+        </p:sp>
+        <p:sp>
+          <p:nvSpPr>
+            <p:cNvPr id="46" name="Rectangle 45">
+              <a:extLst>
+                <a:ext uri="{FF2B5EF4-FFF2-40B4-BE49-F238E27FC236}">
+                  <a16:creationId xmlns:a16="http://schemas.microsoft.com/office/drawing/2014/main" id="{E3182DB3-95CF-4A20-95B7-AC253AE47D3B}"/>
+                </a:ext>
+              </a:extLst>
+            </p:cNvPr>
+            <p:cNvSpPr/>
+            <p:nvPr/>
+          </p:nvSpPr>
+          <p:spPr>
+            <a:xfrm>
+              <a:off x="393700" y="417565"/>
+              <a:ext cx="1657016" cy="425970"/>
+            </a:xfrm>
+            <a:prstGeom prst="rect">
+              <a:avLst/>
+            </a:prstGeom>
+          </p:spPr>
+          <p:txBody>
+            <a:bodyPr wrap="none">
+              <a:spAutoFit/>
+            </a:bodyPr>
+            <a:lstStyle/>
+            <a:p>
+              <a:r>
+                <a:rPr lang="en-US" sz="1200" dirty="0" err="1"/>
+                <a:t>renderUI</a:t>
+              </a:r>
+              <a:r>
+                <a:rPr lang="en-US" sz="1200" dirty="0"/>
+                <a:t>:</a:t>
+              </a:r>
+            </a:p>
+            <a:p>
+              <a:r>
+                <a:rPr lang="en-US" sz="1200" dirty="0" err="1"/>
+                <a:t>output$choose.id.column</a:t>
+              </a:r>
+              <a:endParaRPr lang="en-US" sz="1200" dirty="0"/>
+            </a:p>
+          </p:txBody>
+        </p:sp>
+      </p:grpSp>
+      <p:cxnSp>
+        <p:nvCxnSpPr>
+          <p:cNvPr id="47" name="Straight Arrow Connector 46">
+            <a:extLst>
+              <a:ext uri="{FF2B5EF4-FFF2-40B4-BE49-F238E27FC236}">
+                <a16:creationId xmlns:a16="http://schemas.microsoft.com/office/drawing/2014/main" id="{9F2D571F-8261-4C6E-8937-769A010F5050}"/>
+              </a:ext>
+            </a:extLst>
+          </p:cNvPr>
+          <p:cNvCxnSpPr>
+            <a:cxnSpLocks/>
+            <a:stCxn id="45" idx="3"/>
+            <a:endCxn id="12" idx="1"/>
+          </p:cNvCxnSpPr>
+          <p:nvPr/>
+        </p:nvCxnSpPr>
+        <p:spPr>
+          <a:xfrm>
+            <a:off x="1626263" y="2875295"/>
+            <a:ext cx="1070405" cy="998700"/>
+          </a:xfrm>
+          <a:prstGeom prst="straightConnector1">
+            <a:avLst/>
+          </a:prstGeom>
+          <a:ln>
+            <a:tailEnd type="triangle"/>
+          </a:ln>
+        </p:spPr>
+        <p:style>
+          <a:lnRef idx="1">
+            <a:schemeClr val="dk1"/>
+          </a:lnRef>
+          <a:fillRef idx="0">
+            <a:schemeClr val="dk1"/>
+          </a:fillRef>
+          <a:effectRef idx="0">
+            <a:schemeClr val="dk1"/>
+          </a:effectRef>
+          <a:fontRef idx="minor">
+            <a:schemeClr val="tx1"/>
+          </a:fontRef>
+        </p:style>
+      </p:cxnSp>
+      <p:grpSp>
+        <p:nvGrpSpPr>
+          <p:cNvPr id="51" name="Group 50">
+            <a:extLst>
+              <a:ext uri="{FF2B5EF4-FFF2-40B4-BE49-F238E27FC236}">
+                <a16:creationId xmlns:a16="http://schemas.microsoft.com/office/drawing/2014/main" id="{F38FECA5-1F9E-4761-8C28-12BF063E22A1}"/>
+              </a:ext>
+            </a:extLst>
+          </p:cNvPr>
+          <p:cNvGrpSpPr/>
+          <p:nvPr/>
+        </p:nvGrpSpPr>
+        <p:grpSpPr>
+          <a:xfrm>
+            <a:off x="4064122" y="118741"/>
+            <a:ext cx="2729870" cy="1644164"/>
+            <a:chOff x="410865" y="234459"/>
+            <a:chExt cx="2515502" cy="1644164"/>
+          </a:xfrm>
+        </p:grpSpPr>
+        <p:sp>
+          <p:nvSpPr>
+            <p:cNvPr id="52" name="Rectangle 51">
+              <a:extLst>
+                <a:ext uri="{FF2B5EF4-FFF2-40B4-BE49-F238E27FC236}">
+                  <a16:creationId xmlns:a16="http://schemas.microsoft.com/office/drawing/2014/main" id="{5E781A91-C8CC-4F5A-A6DD-628E917B3ACD}"/>
+                </a:ext>
+              </a:extLst>
+            </p:cNvPr>
+            <p:cNvSpPr/>
+            <p:nvPr/>
+          </p:nvSpPr>
+          <p:spPr>
+            <a:xfrm>
+              <a:off x="490339" y="888158"/>
+              <a:ext cx="2436028" cy="990465"/>
+            </a:xfrm>
+            <a:prstGeom prst="rect">
+              <a:avLst/>
+            </a:prstGeom>
+          </p:spPr>
+          <p:style>
+            <a:lnRef idx="2">
+              <a:schemeClr val="accent2">
+                <a:shade val="50000"/>
+              </a:schemeClr>
+            </a:lnRef>
+            <a:fillRef idx="1">
+              <a:schemeClr val="accent2"/>
+            </a:fillRef>
+            <a:effectRef idx="0">
+              <a:schemeClr val="accent2"/>
+            </a:effectRef>
+            <a:fontRef idx="minor">
+              <a:schemeClr val="lt1"/>
+            </a:fontRef>
+          </p:style>
+          <p:txBody>
+            <a:bodyPr rtlCol="0" anchor="ctr"/>
+            <a:lstStyle/>
+            <a:p>
+              <a:r>
+                <a:rPr lang="en-US" sz="1200" b="1" dirty="0" err="1">
+                  <a:solidFill>
+                    <a:schemeClr val="accent6">
+                      <a:lumMod val="60000"/>
+                      <a:lumOff val="40000"/>
+                    </a:schemeClr>
+                  </a:solidFill>
+                </a:rPr>
+                <a:t>selectizeInput:session.browse</a:t>
+              </a:r>
+              <a:endParaRPr lang="en-US" sz="1200" b="1" dirty="0">
+                <a:solidFill>
+                  <a:schemeClr val="accent6">
+                    <a:lumMod val="60000"/>
+                    <a:lumOff val="40000"/>
+                  </a:schemeClr>
+                </a:solidFill>
+              </a:endParaRPr>
+            </a:p>
+            <a:p>
+              <a:endParaRPr lang="en-US" sz="1200" b="1" dirty="0">
+                <a:solidFill>
+                  <a:schemeClr val="accent6">
+                    <a:lumMod val="60000"/>
+                    <a:lumOff val="40000"/>
+                  </a:schemeClr>
+                </a:solidFill>
+              </a:endParaRPr>
+            </a:p>
+            <a:p>
+              <a:r>
+                <a:rPr lang="en-US" sz="1200" b="1" dirty="0" err="1">
+                  <a:solidFill>
+                    <a:schemeClr val="accent6">
+                      <a:lumMod val="60000"/>
+                      <a:lumOff val="40000"/>
+                    </a:schemeClr>
+                  </a:solidFill>
+                </a:rPr>
+                <a:t>actionButton</a:t>
+              </a:r>
+              <a:r>
+                <a:rPr lang="en-US" sz="1200" b="1" dirty="0">
+                  <a:solidFill>
+                    <a:schemeClr val="accent6">
+                      <a:lumMod val="60000"/>
+                      <a:lumOff val="40000"/>
+                    </a:schemeClr>
+                  </a:solidFill>
+                </a:rPr>
+                <a:t>: </a:t>
+              </a:r>
+              <a:r>
+                <a:rPr lang="en-US" sz="1200" b="1" dirty="0" err="1">
+                  <a:solidFill>
+                    <a:schemeClr val="accent6">
+                      <a:lumMod val="60000"/>
+                      <a:lumOff val="40000"/>
+                    </a:schemeClr>
+                  </a:solidFill>
+                </a:rPr>
+                <a:t>seesion.browse.import</a:t>
+              </a:r>
+              <a:endParaRPr lang="en-US" sz="1200" b="1" dirty="0">
+                <a:solidFill>
+                  <a:schemeClr val="accent6">
+                    <a:lumMod val="60000"/>
+                    <a:lumOff val="40000"/>
+                  </a:schemeClr>
+                </a:solidFill>
+              </a:endParaRPr>
+            </a:p>
+            <a:p>
+              <a:endParaRPr lang="en-US" sz="1200" b="1" dirty="0">
+                <a:solidFill>
+                  <a:schemeClr val="accent6">
+                    <a:lumMod val="60000"/>
+                    <a:lumOff val="40000"/>
+                  </a:schemeClr>
+                </a:solidFill>
+              </a:endParaRPr>
+            </a:p>
+            <a:p>
+              <a:r>
+                <a:rPr lang="en-US" sz="1200" b="1" dirty="0" err="1">
+                  <a:solidFill>
+                    <a:schemeClr val="accent6">
+                      <a:lumMod val="60000"/>
+                      <a:lumOff val="40000"/>
+                    </a:schemeClr>
+                  </a:solidFill>
+                </a:rPr>
+                <a:t>actionButton</a:t>
+              </a:r>
+              <a:r>
+                <a:rPr lang="en-US" sz="1200" b="1" dirty="0">
+                  <a:solidFill>
+                    <a:schemeClr val="accent6">
+                      <a:lumMod val="60000"/>
+                      <a:lumOff val="40000"/>
+                    </a:schemeClr>
+                  </a:solidFill>
+                </a:rPr>
+                <a:t>: </a:t>
+              </a:r>
+              <a:r>
+                <a:rPr lang="en-US" sz="1200" b="1" dirty="0" err="1">
+                  <a:solidFill>
+                    <a:schemeClr val="accent6">
+                      <a:lumMod val="60000"/>
+                      <a:lumOff val="40000"/>
+                    </a:schemeClr>
+                  </a:solidFill>
+                </a:rPr>
+                <a:t>session.manage</a:t>
+              </a:r>
+              <a:endParaRPr lang="en-US" sz="1200" b="1" dirty="0">
+                <a:solidFill>
+                  <a:schemeClr val="accent6">
+                    <a:lumMod val="60000"/>
+                    <a:lumOff val="40000"/>
+                  </a:schemeClr>
+                </a:solidFill>
+              </a:endParaRPr>
+            </a:p>
+          </p:txBody>
+        </p:sp>
+        <p:sp>
+          <p:nvSpPr>
+            <p:cNvPr id="53" name="Rectangle 52">
+              <a:extLst>
+                <a:ext uri="{FF2B5EF4-FFF2-40B4-BE49-F238E27FC236}">
+                  <a16:creationId xmlns:a16="http://schemas.microsoft.com/office/drawing/2014/main" id="{DED5DAAD-C446-457F-A02B-44A329338357}"/>
+                </a:ext>
+              </a:extLst>
+            </p:cNvPr>
+            <p:cNvSpPr/>
+            <p:nvPr/>
+          </p:nvSpPr>
+          <p:spPr>
+            <a:xfrm>
+              <a:off x="410865" y="234459"/>
+              <a:ext cx="1604558" cy="646331"/>
+            </a:xfrm>
+            <a:prstGeom prst="rect">
+              <a:avLst/>
+            </a:prstGeom>
+          </p:spPr>
+          <p:txBody>
+            <a:bodyPr wrap="none">
+              <a:spAutoFit/>
+            </a:bodyPr>
+            <a:lstStyle/>
+            <a:p>
+              <a:r>
+                <a:rPr lang="en-US" sz="1200" b="1" dirty="0">
+                  <a:solidFill>
+                    <a:srgbClr val="FF0000"/>
+                  </a:solidFill>
+                </a:rPr>
+                <a:t>Entry point (SSP only)</a:t>
+              </a:r>
+              <a:endParaRPr lang="en-US" sz="1200" dirty="0"/>
+            </a:p>
+            <a:p>
+              <a:r>
+                <a:rPr lang="en-US" sz="1200" dirty="0" err="1"/>
+                <a:t>renderUI</a:t>
+              </a:r>
+              <a:r>
+                <a:rPr lang="en-US" sz="1200" dirty="0"/>
+                <a:t>:</a:t>
+              </a:r>
+            </a:p>
+            <a:p>
+              <a:r>
+                <a:rPr lang="en-US" sz="1200" dirty="0" err="1"/>
+                <a:t>output$browse.sessions</a:t>
+              </a:r>
+              <a:endParaRPr lang="en-US" sz="1200" dirty="0"/>
+            </a:p>
+          </p:txBody>
+        </p:sp>
+      </p:grpSp>
+      <p:cxnSp>
+        <p:nvCxnSpPr>
+          <p:cNvPr id="54" name="Straight Arrow Connector 53">
+            <a:extLst>
+              <a:ext uri="{FF2B5EF4-FFF2-40B4-BE49-F238E27FC236}">
+                <a16:creationId xmlns:a16="http://schemas.microsoft.com/office/drawing/2014/main" id="{C1B15E62-9394-4D9A-9F18-66C75230A1D2}"/>
+              </a:ext>
+            </a:extLst>
+          </p:cNvPr>
+          <p:cNvCxnSpPr>
+            <a:cxnSpLocks/>
+            <a:stCxn id="52" idx="2"/>
+            <a:endCxn id="7" idx="0"/>
+          </p:cNvCxnSpPr>
+          <p:nvPr/>
+        </p:nvCxnSpPr>
+        <p:spPr>
+          <a:xfrm flipH="1">
+            <a:off x="5471680" y="1762905"/>
+            <a:ext cx="501" cy="3982155"/>
+          </a:xfrm>
+          <a:prstGeom prst="straightConnector1">
+            <a:avLst/>
+          </a:prstGeom>
+          <a:ln>
+            <a:tailEnd type="triangle"/>
+          </a:ln>
+        </p:spPr>
+        <p:style>
+          <a:lnRef idx="1">
+            <a:schemeClr val="dk1"/>
+          </a:lnRef>
+          <a:fillRef idx="0">
+            <a:schemeClr val="dk1"/>
+          </a:fillRef>
+          <a:effectRef idx="0">
+            <a:schemeClr val="dk1"/>
+          </a:effectRef>
+          <a:fontRef idx="minor">
+            <a:schemeClr val="tx1"/>
+          </a:fontRef>
+        </p:style>
+      </p:cxnSp>
+      <p:grpSp>
+        <p:nvGrpSpPr>
+          <p:cNvPr id="57" name="Group 56">
+            <a:extLst>
+              <a:ext uri="{FF2B5EF4-FFF2-40B4-BE49-F238E27FC236}">
+                <a16:creationId xmlns:a16="http://schemas.microsoft.com/office/drawing/2014/main" id="{1B01F8F2-7400-4BF0-A6BB-3FD29AB7A090}"/>
+              </a:ext>
+            </a:extLst>
+          </p:cNvPr>
+          <p:cNvGrpSpPr/>
+          <p:nvPr/>
+        </p:nvGrpSpPr>
+        <p:grpSpPr>
+          <a:xfrm>
+            <a:off x="320660" y="84880"/>
+            <a:ext cx="1768358" cy="1443306"/>
+            <a:chOff x="393700" y="417565"/>
+            <a:chExt cx="1634427" cy="1199291"/>
+          </a:xfrm>
+        </p:grpSpPr>
+        <p:sp>
+          <p:nvSpPr>
+            <p:cNvPr id="58" name="Rectangle 57">
+              <a:extLst>
+                <a:ext uri="{FF2B5EF4-FFF2-40B4-BE49-F238E27FC236}">
+                  <a16:creationId xmlns:a16="http://schemas.microsoft.com/office/drawing/2014/main" id="{489ABC4E-CAAC-49A8-9A3A-B3D47D7D98F0}"/>
+                </a:ext>
+              </a:extLst>
+            </p:cNvPr>
+            <p:cNvSpPr/>
+            <p:nvPr/>
+          </p:nvSpPr>
+          <p:spPr>
+            <a:xfrm>
+              <a:off x="504091" y="987560"/>
+              <a:ext cx="1524036" cy="629296"/>
+            </a:xfrm>
+            <a:prstGeom prst="rect">
+              <a:avLst/>
+            </a:prstGeom>
+          </p:spPr>
+          <p:style>
+            <a:lnRef idx="2">
+              <a:schemeClr val="accent2">
+                <a:shade val="50000"/>
+              </a:schemeClr>
+            </a:lnRef>
+            <a:fillRef idx="1">
+              <a:schemeClr val="accent2"/>
+            </a:fillRef>
+            <a:effectRef idx="0">
+              <a:schemeClr val="accent2"/>
+            </a:effectRef>
+            <a:fontRef idx="minor">
+              <a:schemeClr val="lt1"/>
+            </a:fontRef>
+          </p:style>
+          <p:txBody>
+            <a:bodyPr rtlCol="0" anchor="ctr"/>
+            <a:lstStyle/>
+            <a:p>
+              <a:r>
+                <a:rPr lang="en-US" sz="1200" b="1" dirty="0" err="1">
+                  <a:solidFill>
+                    <a:schemeClr val="bg1"/>
+                  </a:solidFill>
+                </a:rPr>
+                <a:t>Generarte</a:t>
+              </a:r>
+              <a:r>
+                <a:rPr lang="en-US" sz="1200" b="1" dirty="0">
+                  <a:solidFill>
+                    <a:schemeClr val="bg1"/>
+                  </a:solidFill>
+                </a:rPr>
+                <a:t> session id</a:t>
+              </a:r>
+            </a:p>
+            <a:p>
+              <a:r>
+                <a:rPr lang="en-US" sz="1200" b="1" dirty="0">
+                  <a:solidFill>
+                    <a:schemeClr val="bg1"/>
+                  </a:solidFill>
+                </a:rPr>
+                <a:t>Parse ‘user_roles.txt’</a:t>
+              </a:r>
+            </a:p>
+            <a:p>
+              <a:endParaRPr lang="en-US" sz="1200" b="1" dirty="0">
+                <a:solidFill>
+                  <a:schemeClr val="bg1"/>
+                </a:solidFill>
+              </a:endParaRPr>
+            </a:p>
+            <a:p>
+              <a:r>
+                <a:rPr lang="en-US" sz="1200" b="1" dirty="0" err="1">
+                  <a:solidFill>
+                    <a:schemeClr val="accent6">
+                      <a:lumMod val="60000"/>
+                      <a:lumOff val="40000"/>
+                    </a:schemeClr>
+                  </a:solidFill>
+                </a:rPr>
+                <a:t>FileInput</a:t>
+              </a:r>
+              <a:r>
+                <a:rPr lang="en-US" sz="1200" b="1" dirty="0">
+                  <a:solidFill>
+                    <a:schemeClr val="accent6">
+                      <a:lumMod val="60000"/>
+                      <a:lumOff val="40000"/>
+                    </a:schemeClr>
+                  </a:solidFill>
+                </a:rPr>
+                <a:t>: file</a:t>
+              </a:r>
+            </a:p>
+          </p:txBody>
+        </p:sp>
+        <p:sp>
+          <p:nvSpPr>
+            <p:cNvPr id="59" name="Rectangle 58">
+              <a:extLst>
+                <a:ext uri="{FF2B5EF4-FFF2-40B4-BE49-F238E27FC236}">
+                  <a16:creationId xmlns:a16="http://schemas.microsoft.com/office/drawing/2014/main" id="{2355DC1D-37FA-48C1-A093-F76EB86A338E}"/>
+                </a:ext>
+              </a:extLst>
+            </p:cNvPr>
+            <p:cNvSpPr/>
+            <p:nvPr/>
+          </p:nvSpPr>
+          <p:spPr>
+            <a:xfrm>
+              <a:off x="393700" y="417565"/>
+              <a:ext cx="1249281" cy="596359"/>
+            </a:xfrm>
+            <a:prstGeom prst="rect">
+              <a:avLst/>
+            </a:prstGeom>
+          </p:spPr>
+          <p:txBody>
+            <a:bodyPr wrap="none">
+              <a:spAutoFit/>
+            </a:bodyPr>
+            <a:lstStyle/>
+            <a:p>
+              <a:r>
+                <a:rPr lang="en-US" sz="1200" b="1" dirty="0">
+                  <a:solidFill>
+                    <a:srgbClr val="FF0000"/>
+                  </a:solidFill>
+                </a:rPr>
+                <a:t>Entry point</a:t>
+              </a:r>
+            </a:p>
+            <a:p>
+              <a:r>
+                <a:rPr lang="en-US" sz="1200" dirty="0" err="1"/>
+                <a:t>renderUI</a:t>
+              </a:r>
+              <a:r>
+                <a:rPr lang="en-US" sz="1200" dirty="0"/>
+                <a:t>:</a:t>
+              </a:r>
+            </a:p>
+            <a:p>
+              <a:r>
+                <a:rPr lang="en-US" sz="1200" dirty="0" err="1"/>
+                <a:t>output$file.upload</a:t>
+              </a:r>
+              <a:endParaRPr lang="en-US" sz="1200" dirty="0"/>
+            </a:p>
+          </p:txBody>
+        </p:sp>
+      </p:grpSp>
+      <p:cxnSp>
+        <p:nvCxnSpPr>
+          <p:cNvPr id="60" name="Straight Arrow Connector 59">
+            <a:extLst>
+              <a:ext uri="{FF2B5EF4-FFF2-40B4-BE49-F238E27FC236}">
+                <a16:creationId xmlns:a16="http://schemas.microsoft.com/office/drawing/2014/main" id="{D06A30ED-6252-44E4-9C2A-B43BB183EAF3}"/>
+              </a:ext>
+            </a:extLst>
+          </p:cNvPr>
+          <p:cNvCxnSpPr>
+            <a:cxnSpLocks/>
+            <a:stCxn id="58" idx="2"/>
+            <a:endCxn id="9" idx="1"/>
+          </p:cNvCxnSpPr>
+          <p:nvPr/>
+        </p:nvCxnSpPr>
+        <p:spPr>
+          <a:xfrm>
+            <a:off x="1264558" y="1528186"/>
+            <a:ext cx="1385167" cy="376565"/>
+          </a:xfrm>
+          <a:prstGeom prst="straightConnector1">
+            <a:avLst/>
+          </a:prstGeom>
+          <a:ln>
+            <a:tailEnd type="triangle"/>
+          </a:ln>
+        </p:spPr>
+        <p:style>
+          <a:lnRef idx="1">
+            <a:schemeClr val="dk1"/>
+          </a:lnRef>
+          <a:fillRef idx="0">
+            <a:schemeClr val="dk1"/>
+          </a:fillRef>
+          <a:effectRef idx="0">
+            <a:schemeClr val="dk1"/>
+          </a:effectRef>
+          <a:fontRef idx="minor">
+            <a:schemeClr val="tx1"/>
+          </a:fontRef>
+        </p:style>
+      </p:cxnSp>
+      <p:grpSp>
+        <p:nvGrpSpPr>
+          <p:cNvPr id="64" name="Group 63">
+            <a:extLst>
+              <a:ext uri="{FF2B5EF4-FFF2-40B4-BE49-F238E27FC236}">
+                <a16:creationId xmlns:a16="http://schemas.microsoft.com/office/drawing/2014/main" id="{5AC4A8D9-E83C-4D15-BDD6-71F00D5CDF9D}"/>
+              </a:ext>
+            </a:extLst>
+          </p:cNvPr>
+          <p:cNvGrpSpPr/>
+          <p:nvPr/>
+        </p:nvGrpSpPr>
+        <p:grpSpPr>
+          <a:xfrm>
+            <a:off x="2939876" y="7707753"/>
+            <a:ext cx="2022322" cy="2045592"/>
+            <a:chOff x="393700" y="417565"/>
+            <a:chExt cx="3080058" cy="2363669"/>
+          </a:xfrm>
+        </p:grpSpPr>
+        <p:sp>
+          <p:nvSpPr>
+            <p:cNvPr id="65" name="Rectangle 64">
+              <a:extLst>
+                <a:ext uri="{FF2B5EF4-FFF2-40B4-BE49-F238E27FC236}">
+                  <a16:creationId xmlns:a16="http://schemas.microsoft.com/office/drawing/2014/main" id="{14C5E434-76D3-4601-9157-6383D5AC9F5B}"/>
+                </a:ext>
+              </a:extLst>
+            </p:cNvPr>
+            <p:cNvSpPr/>
+            <p:nvPr/>
+          </p:nvSpPr>
+          <p:spPr>
+            <a:xfrm>
+              <a:off x="504091" y="922532"/>
+              <a:ext cx="2969667" cy="1858702"/>
+            </a:xfrm>
+            <a:prstGeom prst="rect">
+              <a:avLst/>
+            </a:prstGeom>
+          </p:spPr>
+          <p:style>
+            <a:lnRef idx="2">
+              <a:schemeClr val="accent2">
+                <a:shade val="50000"/>
+              </a:schemeClr>
+            </a:lnRef>
+            <a:fillRef idx="1">
+              <a:schemeClr val="accent2"/>
+            </a:fillRef>
+            <a:effectRef idx="0">
+              <a:schemeClr val="accent2"/>
+            </a:effectRef>
+            <a:fontRef idx="minor">
+              <a:schemeClr val="lt1"/>
+            </a:fontRef>
+          </p:style>
+          <p:txBody>
+            <a:bodyPr rtlCol="0" anchor="ctr"/>
+            <a:lstStyle/>
+            <a:p>
+              <a:pPr algn="ctr"/>
+              <a:r>
+                <a:rPr lang="en-US" sz="1200" b="1" dirty="0"/>
+                <a:t>Present output</a:t>
+              </a:r>
+            </a:p>
+            <a:p>
+              <a:pPr marL="171450" indent="-171450">
+                <a:buFontTx/>
+                <a:buChar char="-"/>
+              </a:pPr>
+              <a:r>
+                <a:rPr lang="en-US" sz="1200" b="1" dirty="0"/>
+                <a:t>Summary tab</a:t>
+              </a:r>
+            </a:p>
+            <a:p>
+              <a:pPr marL="171450" indent="-171450">
+                <a:buFontTx/>
+                <a:buChar char="-"/>
+              </a:pPr>
+              <a:r>
+                <a:rPr lang="en-US" sz="1200" b="1" dirty="0"/>
+                <a:t>Heatmap</a:t>
+              </a:r>
+            </a:p>
+            <a:p>
+              <a:pPr marL="171450" indent="-171450">
+                <a:buFontTx/>
+                <a:buChar char="-"/>
+              </a:pPr>
+              <a:r>
+                <a:rPr lang="en-US" sz="1200" b="1" dirty="0"/>
+                <a:t>Volcanos</a:t>
+              </a:r>
+            </a:p>
+            <a:p>
+              <a:pPr marL="171450" indent="-171450">
+                <a:buFontTx/>
+                <a:buChar char="-"/>
+              </a:pPr>
+              <a:r>
+                <a:rPr lang="en-US" sz="1200" b="1" dirty="0"/>
+                <a:t>Scatterplots</a:t>
+              </a:r>
+            </a:p>
+            <a:p>
+              <a:pPr marL="171450" indent="-171450">
+                <a:buFontTx/>
+                <a:buChar char="-"/>
+              </a:pPr>
+              <a:r>
+                <a:rPr lang="en-US" sz="1200" b="1" dirty="0"/>
+                <a:t>PCA</a:t>
+              </a:r>
+            </a:p>
+            <a:p>
+              <a:pPr marL="171450" indent="-171450">
+                <a:buFontTx/>
+                <a:buChar char="-"/>
+              </a:pPr>
+              <a:r>
+                <a:rPr lang="en-US" sz="1200" b="1" dirty="0"/>
+                <a:t>QC</a:t>
+              </a:r>
+            </a:p>
+            <a:p>
+              <a:pPr marL="171450" indent="-171450">
+                <a:buFontTx/>
+                <a:buChar char="-"/>
+              </a:pPr>
+              <a:r>
+                <a:rPr lang="en-US" sz="1200" b="1" dirty="0"/>
+                <a:t>Export results</a:t>
+              </a:r>
+              <a:endParaRPr lang="en-US" sz="1200" dirty="0"/>
+            </a:p>
+          </p:txBody>
+        </p:sp>
+        <p:sp>
+          <p:nvSpPr>
+            <p:cNvPr id="66" name="Rectangle 65">
+              <a:extLst>
+                <a:ext uri="{FF2B5EF4-FFF2-40B4-BE49-F238E27FC236}">
+                  <a16:creationId xmlns:a16="http://schemas.microsoft.com/office/drawing/2014/main" id="{ACEED540-A7AF-4D43-A50C-505710177354}"/>
+                </a:ext>
+              </a:extLst>
+            </p:cNvPr>
+            <p:cNvSpPr/>
+            <p:nvPr/>
+          </p:nvSpPr>
+          <p:spPr>
+            <a:xfrm>
+              <a:off x="393700" y="417565"/>
+              <a:ext cx="1115049" cy="461665"/>
+            </a:xfrm>
+            <a:prstGeom prst="rect">
+              <a:avLst/>
+            </a:prstGeom>
+          </p:spPr>
+          <p:txBody>
+            <a:bodyPr wrap="none">
+              <a:spAutoFit/>
+            </a:bodyPr>
+            <a:lstStyle/>
+            <a:p>
+              <a:r>
+                <a:rPr lang="en-US" sz="1200" dirty="0" err="1"/>
+                <a:t>renderUI</a:t>
+              </a:r>
+              <a:r>
+                <a:rPr lang="en-US" sz="1200" dirty="0"/>
+                <a:t>:</a:t>
+              </a:r>
+            </a:p>
+            <a:p>
+              <a:r>
+                <a:rPr lang="en-US" sz="1200" dirty="0" err="1"/>
+                <a:t>output$navbar</a:t>
+              </a:r>
+              <a:endParaRPr lang="en-US" sz="1200" dirty="0"/>
+            </a:p>
+          </p:txBody>
+        </p:sp>
+      </p:grpSp>
+      <p:cxnSp>
+        <p:nvCxnSpPr>
+          <p:cNvPr id="70" name="Straight Arrow Connector 69">
+            <a:extLst>
+              <a:ext uri="{FF2B5EF4-FFF2-40B4-BE49-F238E27FC236}">
+                <a16:creationId xmlns:a16="http://schemas.microsoft.com/office/drawing/2014/main" id="{56EDE5AA-54A2-4792-B70A-6DFE20E35210}"/>
+              </a:ext>
+            </a:extLst>
+          </p:cNvPr>
+          <p:cNvCxnSpPr>
+            <a:cxnSpLocks/>
+            <a:stCxn id="65" idx="2"/>
+            <a:endCxn id="19" idx="0"/>
+          </p:cNvCxnSpPr>
+          <p:nvPr/>
+        </p:nvCxnSpPr>
+        <p:spPr>
+          <a:xfrm flipH="1">
+            <a:off x="3893064" y="9753345"/>
+            <a:ext cx="94214" cy="389034"/>
+          </a:xfrm>
+          <a:prstGeom prst="straightConnector1">
+            <a:avLst/>
+          </a:prstGeom>
+          <a:ln>
+            <a:tailEnd type="triangle"/>
+          </a:ln>
+        </p:spPr>
+        <p:style>
+          <a:lnRef idx="1">
+            <a:schemeClr val="dk1"/>
+          </a:lnRef>
+          <a:fillRef idx="0">
+            <a:schemeClr val="dk1"/>
+          </a:fillRef>
+          <a:effectRef idx="0">
+            <a:schemeClr val="dk1"/>
+          </a:effectRef>
+          <a:fontRef idx="minor">
+            <a:schemeClr val="tx1"/>
+          </a:fontRef>
+        </p:style>
+      </p:cxnSp>
+      <p:cxnSp>
+        <p:nvCxnSpPr>
+          <p:cNvPr id="75" name="Straight Arrow Connector 74">
+            <a:extLst>
+              <a:ext uri="{FF2B5EF4-FFF2-40B4-BE49-F238E27FC236}">
+                <a16:creationId xmlns:a16="http://schemas.microsoft.com/office/drawing/2014/main" id="{EDC24165-0F19-4D43-9862-EE66F9B7327A}"/>
+              </a:ext>
+            </a:extLst>
+          </p:cNvPr>
+          <p:cNvCxnSpPr>
+            <a:cxnSpLocks/>
+            <a:stCxn id="65" idx="1"/>
+            <a:endCxn id="32" idx="3"/>
+          </p:cNvCxnSpPr>
+          <p:nvPr/>
+        </p:nvCxnSpPr>
+        <p:spPr>
+          <a:xfrm flipH="1" flipV="1">
+            <a:off x="1837013" y="8947159"/>
+            <a:ext cx="1175344" cy="1897"/>
+          </a:xfrm>
+          <a:prstGeom prst="straightConnector1">
+            <a:avLst/>
+          </a:prstGeom>
+          <a:ln w="38100">
+            <a:headEnd type="triangle"/>
+            <a:tailEnd type="triangle"/>
+          </a:ln>
+        </p:spPr>
+        <p:style>
+          <a:lnRef idx="1">
+            <a:schemeClr val="dk1"/>
+          </a:lnRef>
+          <a:fillRef idx="0">
+            <a:schemeClr val="dk1"/>
+          </a:fillRef>
+          <a:effectRef idx="0">
+            <a:schemeClr val="dk1"/>
+          </a:effectRef>
+          <a:fontRef idx="minor">
+            <a:schemeClr val="tx1"/>
+          </a:fontRef>
+        </p:style>
+      </p:cxnSp>
+      <p:cxnSp>
+        <p:nvCxnSpPr>
+          <p:cNvPr id="80" name="Straight Arrow Connector 79">
+            <a:extLst>
+              <a:ext uri="{FF2B5EF4-FFF2-40B4-BE49-F238E27FC236}">
+                <a16:creationId xmlns:a16="http://schemas.microsoft.com/office/drawing/2014/main" id="{20687CEB-1573-4BD8-A100-1C8450063706}"/>
+              </a:ext>
+            </a:extLst>
+          </p:cNvPr>
+          <p:cNvCxnSpPr>
+            <a:cxnSpLocks/>
+            <a:stCxn id="24" idx="1"/>
+            <a:endCxn id="45" idx="3"/>
+          </p:cNvCxnSpPr>
+          <p:nvPr/>
+        </p:nvCxnSpPr>
+        <p:spPr>
+          <a:xfrm flipH="1">
+            <a:off x="1626263" y="2691299"/>
+            <a:ext cx="1274803" cy="183996"/>
+          </a:xfrm>
+          <a:prstGeom prst="straightConnector1">
+            <a:avLst/>
+          </a:prstGeom>
+          <a:ln>
+            <a:tailEnd type="triangle"/>
+          </a:ln>
+        </p:spPr>
+        <p:style>
+          <a:lnRef idx="1">
+            <a:schemeClr val="dk1"/>
+          </a:lnRef>
+          <a:fillRef idx="0">
+            <a:schemeClr val="dk1"/>
+          </a:fillRef>
+          <a:effectRef idx="0">
+            <a:schemeClr val="dk1"/>
+          </a:effectRef>
+          <a:fontRef idx="minor">
+            <a:schemeClr val="tx1"/>
+          </a:fontRef>
+        </p:style>
+      </p:cxnSp>
+      <p:cxnSp>
+        <p:nvCxnSpPr>
+          <p:cNvPr id="89" name="Straight Arrow Connector 88">
+            <a:extLst>
+              <a:ext uri="{FF2B5EF4-FFF2-40B4-BE49-F238E27FC236}">
+                <a16:creationId xmlns:a16="http://schemas.microsoft.com/office/drawing/2014/main" id="{79C84117-F3A1-403B-A38C-7F2822710C1A}"/>
+              </a:ext>
+            </a:extLst>
+          </p:cNvPr>
+          <p:cNvCxnSpPr>
+            <a:cxnSpLocks/>
+            <a:stCxn id="12" idx="1"/>
+            <a:endCxn id="35" idx="3"/>
+          </p:cNvCxnSpPr>
+          <p:nvPr/>
+        </p:nvCxnSpPr>
+        <p:spPr>
+          <a:xfrm flipH="1">
+            <a:off x="1602611" y="3873995"/>
+            <a:ext cx="1094057" cy="738621"/>
+          </a:xfrm>
+          <a:prstGeom prst="straightConnector1">
+            <a:avLst/>
+          </a:prstGeom>
+          <a:ln>
+            <a:tailEnd type="triangle"/>
+          </a:ln>
+        </p:spPr>
+        <p:style>
+          <a:lnRef idx="1">
+            <a:schemeClr val="dk1"/>
+          </a:lnRef>
+          <a:fillRef idx="0">
+            <a:schemeClr val="dk1"/>
+          </a:fillRef>
+          <a:effectRef idx="0">
+            <a:schemeClr val="dk1"/>
+          </a:effectRef>
+          <a:fontRef idx="minor">
+            <a:schemeClr val="tx1"/>
+          </a:fontRef>
+        </p:style>
+      </p:cxnSp>
+      <p:cxnSp>
+        <p:nvCxnSpPr>
+          <p:cNvPr id="93" name="Straight Arrow Connector 92">
+            <a:extLst>
+              <a:ext uri="{FF2B5EF4-FFF2-40B4-BE49-F238E27FC236}">
+                <a16:creationId xmlns:a16="http://schemas.microsoft.com/office/drawing/2014/main" id="{1537EACB-0F8E-4FF2-84DD-B3979BAC7507}"/>
+              </a:ext>
+            </a:extLst>
+          </p:cNvPr>
+          <p:cNvCxnSpPr>
+            <a:cxnSpLocks/>
+            <a:stCxn id="2" idx="1"/>
+            <a:endCxn id="22" idx="3"/>
+          </p:cNvCxnSpPr>
+          <p:nvPr/>
+        </p:nvCxnSpPr>
+        <p:spPr>
+          <a:xfrm flipH="1">
+            <a:off x="1386320" y="5259973"/>
+            <a:ext cx="1300362" cy="930437"/>
+          </a:xfrm>
+          <a:prstGeom prst="straightConnector1">
+            <a:avLst/>
+          </a:prstGeom>
+          <a:ln>
+            <a:tailEnd type="triangle"/>
+          </a:ln>
+        </p:spPr>
+        <p:style>
+          <a:lnRef idx="1">
+            <a:schemeClr val="dk1"/>
+          </a:lnRef>
+          <a:fillRef idx="0">
+            <a:schemeClr val="dk1"/>
+          </a:fillRef>
+          <a:effectRef idx="0">
+            <a:schemeClr val="dk1"/>
+          </a:effectRef>
+          <a:fontRef idx="minor">
+            <a:schemeClr val="tx1"/>
+          </a:fontRef>
+        </p:style>
+      </p:cxnSp>
+      <p:cxnSp>
+        <p:nvCxnSpPr>
+          <p:cNvPr id="96" name="Straight Arrow Connector 95">
+            <a:extLst>
+              <a:ext uri="{FF2B5EF4-FFF2-40B4-BE49-F238E27FC236}">
+                <a16:creationId xmlns:a16="http://schemas.microsoft.com/office/drawing/2014/main" id="{F4A1F58B-3F09-449F-9245-E8457A3FB5F4}"/>
+              </a:ext>
+            </a:extLst>
+          </p:cNvPr>
+          <p:cNvCxnSpPr>
+            <a:cxnSpLocks/>
+            <a:stCxn id="22" idx="3"/>
+            <a:endCxn id="15" idx="1"/>
+          </p:cNvCxnSpPr>
+          <p:nvPr/>
+        </p:nvCxnSpPr>
+        <p:spPr>
+          <a:xfrm>
+            <a:off x="1386320" y="6190410"/>
+            <a:ext cx="1310348" cy="570291"/>
+          </a:xfrm>
+          <a:prstGeom prst="straightConnector1">
+            <a:avLst/>
+          </a:prstGeom>
+          <a:ln>
+            <a:tailEnd type="triangle"/>
+          </a:ln>
+        </p:spPr>
+        <p:style>
+          <a:lnRef idx="1">
+            <a:schemeClr val="dk1"/>
+          </a:lnRef>
+          <a:fillRef idx="0">
+            <a:schemeClr val="dk1"/>
+          </a:fillRef>
+          <a:effectRef idx="0">
+            <a:schemeClr val="dk1"/>
+          </a:effectRef>
+          <a:fontRef idx="minor">
+            <a:schemeClr val="tx1"/>
+          </a:fontRef>
+        </p:style>
+      </p:cxnSp>
+      <p:cxnSp>
+        <p:nvCxnSpPr>
+          <p:cNvPr id="116" name="Straight Arrow Connector 115">
+            <a:extLst>
+              <a:ext uri="{FF2B5EF4-FFF2-40B4-BE49-F238E27FC236}">
+                <a16:creationId xmlns:a16="http://schemas.microsoft.com/office/drawing/2014/main" id="{989620A3-259D-41CE-83BB-45B52322E725}"/>
+              </a:ext>
+            </a:extLst>
+          </p:cNvPr>
+          <p:cNvCxnSpPr>
+            <a:cxnSpLocks/>
+            <a:stCxn id="6" idx="2"/>
+            <a:endCxn id="66" idx="0"/>
+          </p:cNvCxnSpPr>
+          <p:nvPr/>
+        </p:nvCxnSpPr>
+        <p:spPr>
+          <a:xfrm flipH="1">
+            <a:off x="3305939" y="6863218"/>
+            <a:ext cx="1899484" cy="844535"/>
+          </a:xfrm>
+          <a:prstGeom prst="straightConnector1">
+            <a:avLst/>
+          </a:prstGeom>
+          <a:ln>
+            <a:tailEnd type="triangle"/>
+          </a:ln>
+        </p:spPr>
+        <p:style>
+          <a:lnRef idx="1">
+            <a:schemeClr val="dk1"/>
+          </a:lnRef>
+          <a:fillRef idx="0">
+            <a:schemeClr val="dk1"/>
+          </a:fillRef>
+          <a:effectRef idx="0">
+            <a:schemeClr val="dk1"/>
+          </a:effectRef>
+          <a:fontRef idx="minor">
+            <a:schemeClr val="tx1"/>
+          </a:fontRef>
+        </p:style>
+      </p:cxnSp>
+      <p:cxnSp>
+        <p:nvCxnSpPr>
+          <p:cNvPr id="128" name="Straight Arrow Connector 127">
+            <a:extLst>
+              <a:ext uri="{FF2B5EF4-FFF2-40B4-BE49-F238E27FC236}">
+                <a16:creationId xmlns:a16="http://schemas.microsoft.com/office/drawing/2014/main" id="{A17E71E4-BA49-499D-9152-B4807B4653A2}"/>
+              </a:ext>
+            </a:extLst>
+          </p:cNvPr>
+          <p:cNvCxnSpPr>
+            <a:cxnSpLocks/>
+            <a:stCxn id="66" idx="0"/>
+            <a:endCxn id="15" idx="2"/>
+          </p:cNvCxnSpPr>
+          <p:nvPr/>
+        </p:nvCxnSpPr>
+        <p:spPr>
+          <a:xfrm flipV="1">
+            <a:off x="3305939" y="7199113"/>
+            <a:ext cx="17914" cy="508640"/>
+          </a:xfrm>
+          <a:prstGeom prst="straightConnector1">
+            <a:avLst/>
+          </a:prstGeom>
+          <a:ln w="38100">
+            <a:headEnd type="triangle"/>
+            <a:tailEnd type="triangle"/>
+          </a:ln>
+        </p:spPr>
+        <p:style>
+          <a:lnRef idx="1">
+            <a:schemeClr val="dk1"/>
+          </a:lnRef>
+          <a:fillRef idx="0">
+            <a:schemeClr val="dk1"/>
+          </a:fillRef>
+          <a:effectRef idx="0">
+            <a:schemeClr val="dk1"/>
+          </a:effectRef>
+          <a:fontRef idx="minor">
+            <a:schemeClr val="tx1"/>
+          </a:fontRef>
+        </p:style>
+      </p:cxnSp>
+      <p:grpSp>
+        <p:nvGrpSpPr>
+          <p:cNvPr id="28" name="Group 27">
+            <a:extLst>
+              <a:ext uri="{FF2B5EF4-FFF2-40B4-BE49-F238E27FC236}">
+                <a16:creationId xmlns:a16="http://schemas.microsoft.com/office/drawing/2014/main" id="{1CDCB289-B823-4268-B479-9FA233FC78B8}"/>
+              </a:ext>
+            </a:extLst>
+          </p:cNvPr>
+          <p:cNvGrpSpPr/>
+          <p:nvPr/>
+        </p:nvGrpSpPr>
+        <p:grpSpPr>
+          <a:xfrm>
+            <a:off x="2901066" y="2405105"/>
+            <a:ext cx="758797" cy="574235"/>
+            <a:chOff x="2897511" y="2505882"/>
+            <a:chExt cx="758797" cy="574235"/>
+          </a:xfrm>
+        </p:grpSpPr>
+        <p:sp>
+          <p:nvSpPr>
+            <p:cNvPr id="20" name="Oval 19">
+              <a:extLst>
+                <a:ext uri="{FF2B5EF4-FFF2-40B4-BE49-F238E27FC236}">
+                  <a16:creationId xmlns:a16="http://schemas.microsoft.com/office/drawing/2014/main" id="{91CF4C30-1845-47A8-80AE-462B55720359}"/>
+                </a:ext>
+              </a:extLst>
+            </p:cNvPr>
+            <p:cNvSpPr/>
+            <p:nvPr/>
+          </p:nvSpPr>
+          <p:spPr>
+            <a:xfrm>
+              <a:off x="2936160" y="2505882"/>
+              <a:ext cx="636669" cy="574235"/>
+            </a:xfrm>
+            <a:prstGeom prst="ellipse">
+              <a:avLst/>
+            </a:prstGeom>
+          </p:spPr>
+          <p:style>
+            <a:lnRef idx="2">
+              <a:schemeClr val="accent6">
+                <a:shade val="50000"/>
+              </a:schemeClr>
+            </a:lnRef>
+            <a:fillRef idx="1">
+              <a:schemeClr val="accent6"/>
+            </a:fillRef>
+            <a:effectRef idx="0">
+              <a:schemeClr val="accent6"/>
+            </a:effectRef>
+            <a:fontRef idx="minor">
+              <a:schemeClr val="lt1"/>
+            </a:fontRef>
+          </p:style>
+          <p:txBody>
+            <a:bodyPr rtlCol="0" anchor="ctr"/>
+            <a:lstStyle/>
+            <a:p>
+              <a:pPr algn="ctr"/>
+              <a:endParaRPr lang="en-US" sz="1050" dirty="0"/>
+            </a:p>
+          </p:txBody>
+        </p:sp>
+        <p:sp>
+          <p:nvSpPr>
+            <p:cNvPr id="24" name="TextBox 23">
+              <a:extLst>
+                <a:ext uri="{FF2B5EF4-FFF2-40B4-BE49-F238E27FC236}">
+                  <a16:creationId xmlns:a16="http://schemas.microsoft.com/office/drawing/2014/main" id="{39CCBB42-E1F5-4397-B7FD-CD0D2C6B24AB}"/>
+                </a:ext>
+              </a:extLst>
+            </p:cNvPr>
+            <p:cNvSpPr txBox="1"/>
+            <p:nvPr/>
+          </p:nvSpPr>
+          <p:spPr>
+            <a:xfrm>
+              <a:off x="2897511" y="2607410"/>
+              <a:ext cx="758797" cy="369332"/>
+            </a:xfrm>
+            <a:prstGeom prst="rect">
+              <a:avLst/>
+            </a:prstGeom>
+            <a:noFill/>
+          </p:spPr>
+          <p:txBody>
+            <a:bodyPr wrap="none" rtlCol="0">
+              <a:spAutoFit/>
+            </a:bodyPr>
+            <a:lstStyle/>
+            <a:p>
+              <a:r>
+                <a:rPr lang="en-US" dirty="0"/>
+                <a:t>gct1.3</a:t>
+              </a:r>
+            </a:p>
+          </p:txBody>
+        </p:sp>
+      </p:grpSp>
+      <p:cxnSp>
+        <p:nvCxnSpPr>
+          <p:cNvPr id="67" name="Straight Arrow Connector 66">
+            <a:extLst>
+              <a:ext uri="{FF2B5EF4-FFF2-40B4-BE49-F238E27FC236}">
+                <a16:creationId xmlns:a16="http://schemas.microsoft.com/office/drawing/2014/main" id="{CAAC6835-E7E4-4073-9957-599C6E074ADA}"/>
+              </a:ext>
+            </a:extLst>
+          </p:cNvPr>
+          <p:cNvCxnSpPr>
+            <a:cxnSpLocks/>
+            <a:stCxn id="9" idx="2"/>
+            <a:endCxn id="20" idx="0"/>
+          </p:cNvCxnSpPr>
+          <p:nvPr/>
+        </p:nvCxnSpPr>
+        <p:spPr>
+          <a:xfrm flipH="1">
+            <a:off x="3258050" y="2232997"/>
+            <a:ext cx="18860" cy="172108"/>
+          </a:xfrm>
+          <a:prstGeom prst="straightConnector1">
+            <a:avLst/>
+          </a:prstGeom>
+          <a:ln>
+            <a:tailEnd type="triangle"/>
+          </a:ln>
+        </p:spPr>
+        <p:style>
+          <a:lnRef idx="1">
+            <a:schemeClr val="dk1"/>
+          </a:lnRef>
+          <a:fillRef idx="0">
+            <a:schemeClr val="dk1"/>
+          </a:fillRef>
+          <a:effectRef idx="0">
+            <a:schemeClr val="dk1"/>
+          </a:effectRef>
+          <a:fontRef idx="minor">
+            <a:schemeClr val="tx1"/>
+          </a:fontRef>
+        </p:style>
+      </p:cxnSp>
+      <p:sp>
+        <p:nvSpPr>
+          <p:cNvPr id="43" name="TextBox 42">
+            <a:extLst>
+              <a:ext uri="{FF2B5EF4-FFF2-40B4-BE49-F238E27FC236}">
+                <a16:creationId xmlns:a16="http://schemas.microsoft.com/office/drawing/2014/main" id="{48839CC2-1125-4A19-8CC5-36E2922AA44E}"/>
+              </a:ext>
+            </a:extLst>
+          </p:cNvPr>
+          <p:cNvSpPr txBox="1"/>
+          <p:nvPr/>
+        </p:nvSpPr>
+        <p:spPr>
+          <a:xfrm>
+            <a:off x="2199517" y="2450164"/>
+            <a:ext cx="428322" cy="369332"/>
+          </a:xfrm>
+          <a:prstGeom prst="rect">
+            <a:avLst/>
+          </a:prstGeom>
+          <a:noFill/>
+        </p:spPr>
+        <p:txBody>
+          <a:bodyPr wrap="none" rtlCol="0">
+            <a:spAutoFit/>
+          </a:bodyPr>
+          <a:lstStyle/>
+          <a:p>
+            <a:r>
+              <a:rPr lang="en-US" dirty="0"/>
+              <a:t>no</a:t>
+            </a:r>
+          </a:p>
+        </p:txBody>
+      </p:sp>
+    </p:spTree>
+    <p:extLst>
+      <p:ext uri="{BB962C8B-B14F-4D97-AF65-F5344CB8AC3E}">
+        <p14:creationId xmlns:p14="http://schemas.microsoft.com/office/powerpoint/2010/main" val="777602451"/>
       </p:ext>
     </p:extLst>
   </p:cSld>

</xml_diff>